<commit_message>
Update mail file and rerun all cell, update contains and syntax correction v1
</commit_message>
<xml_diff>
--- a/Présentation/P04_02_presentation.pptx
+++ b/Présentation/P04_02_presentation.pptx
@@ -5,7 +5,7 @@
     <p:sldMasterId id="2147483734" r:id="rId1"/>
   </p:sldMasterIdLst>
   <p:notesMasterIdLst>
-    <p:notesMasterId r:id="rId22"/>
+    <p:notesMasterId r:id="rId28"/>
   </p:notesMasterIdLst>
   <p:sldIdLst>
     <p:sldId id="256" r:id="rId2"/>
@@ -16,18 +16,24 @@
     <p:sldId id="266" r:id="rId7"/>
     <p:sldId id="267" r:id="rId8"/>
     <p:sldId id="275" r:id="rId9"/>
-    <p:sldId id="261" r:id="rId10"/>
-    <p:sldId id="268" r:id="rId11"/>
-    <p:sldId id="269" r:id="rId12"/>
-    <p:sldId id="262" r:id="rId13"/>
-    <p:sldId id="270" r:id="rId14"/>
-    <p:sldId id="271" r:id="rId15"/>
-    <p:sldId id="263" r:id="rId16"/>
-    <p:sldId id="272" r:id="rId17"/>
-    <p:sldId id="273" r:id="rId18"/>
-    <p:sldId id="264" r:id="rId19"/>
-    <p:sldId id="274" r:id="rId20"/>
-    <p:sldId id="265" r:id="rId21"/>
+    <p:sldId id="276" r:id="rId10"/>
+    <p:sldId id="261" r:id="rId11"/>
+    <p:sldId id="268" r:id="rId12"/>
+    <p:sldId id="269" r:id="rId13"/>
+    <p:sldId id="277" r:id="rId14"/>
+    <p:sldId id="280" r:id="rId15"/>
+    <p:sldId id="281" r:id="rId16"/>
+    <p:sldId id="262" r:id="rId17"/>
+    <p:sldId id="278" r:id="rId18"/>
+    <p:sldId id="270" r:id="rId19"/>
+    <p:sldId id="271" r:id="rId20"/>
+    <p:sldId id="263" r:id="rId21"/>
+    <p:sldId id="279" r:id="rId22"/>
+    <p:sldId id="272" r:id="rId23"/>
+    <p:sldId id="273" r:id="rId24"/>
+    <p:sldId id="264" r:id="rId25"/>
+    <p:sldId id="274" r:id="rId26"/>
+    <p:sldId id="265" r:id="rId27"/>
   </p:sldIdLst>
   <p:sldSz cx="12192000" cy="6858000"/>
   <p:notesSz cx="6858000" cy="9144000"/>
@@ -12637,7 +12643,7 @@
           <a:p>
             <a:fld id="{DB1E78C9-29F1-481D-8E62-6E696A17A48E}" type="datetimeFigureOut">
               <a:rPr lang="fr-FR" smtClean="0"/>
-              <a:t>19/07/2021</a:t>
+              <a:t>20/07/2021</a:t>
             </a:fld>
             <a:endParaRPr lang="fr-FR"/>
           </a:p>
@@ -13053,7 +13059,7 @@
           <a:p>
             <a:fld id="{7E57C73F-21BA-4C35-A802-B84FC748F1E6}" type="slidenum">
               <a:rPr lang="fr-FR" smtClean="0"/>
-              <a:t>20</a:t>
+              <a:t>26</a:t>
             </a:fld>
             <a:endParaRPr lang="fr-FR"/>
           </a:p>
@@ -13219,7 +13225,7 @@
           <a:p>
             <a:fld id="{82EDB8D0-98ED-4B86-9D5F-E61ADC70144D}" type="datetimeFigureOut">
               <a:rPr lang="en-US" smtClean="0"/>
-              <a:t>7/19/2021</a:t>
+              <a:t>7/20/2021</a:t>
             </a:fld>
             <a:endParaRPr lang="en-US" dirty="0"/>
           </a:p>
@@ -13634,7 +13640,7 @@
           <a:p>
             <a:fld id="{82EDB8D0-98ED-4B86-9D5F-E61ADC70144D}" type="datetimeFigureOut">
               <a:rPr lang="en-US" smtClean="0"/>
-              <a:t>7/19/2021</a:t>
+              <a:t>7/20/2021</a:t>
             </a:fld>
             <a:endParaRPr lang="en-US"/>
           </a:p>
@@ -14126,7 +14132,7 @@
           <a:p>
             <a:fld id="{82EDB8D0-98ED-4B86-9D5F-E61ADC70144D}" type="datetimeFigureOut">
               <a:rPr lang="en-US" smtClean="0"/>
-              <a:t>7/19/2021</a:t>
+              <a:t>7/20/2021</a:t>
             </a:fld>
             <a:endParaRPr lang="en-US"/>
           </a:p>
@@ -14613,7 +14619,7 @@
           <a:p>
             <a:fld id="{82EDB8D0-98ED-4B86-9D5F-E61ADC70144D}" type="datetimeFigureOut">
               <a:rPr lang="en-US" smtClean="0"/>
-              <a:t>7/19/2021</a:t>
+              <a:t>7/20/2021</a:t>
             </a:fld>
             <a:endParaRPr lang="en-US" dirty="0"/>
           </a:p>
@@ -15382,7 +15388,7 @@
           <a:p>
             <a:fld id="{82EDB8D0-98ED-4B86-9D5F-E61ADC70144D}" type="datetimeFigureOut">
               <a:rPr lang="en-US" smtClean="0"/>
-              <a:t>7/19/2021</a:t>
+              <a:t>7/20/2021</a:t>
             </a:fld>
             <a:endParaRPr lang="en-US"/>
           </a:p>
@@ -15864,7 +15870,7 @@
           <a:p>
             <a:fld id="{82EDB8D0-98ED-4B86-9D5F-E61ADC70144D}" type="datetimeFigureOut">
               <a:rPr lang="en-US" smtClean="0"/>
-              <a:t>7/19/2021</a:t>
+              <a:t>7/20/2021</a:t>
             </a:fld>
             <a:endParaRPr lang="en-US"/>
           </a:p>
@@ -16560,7 +16566,7 @@
           <a:p>
             <a:fld id="{82EDB8D0-98ED-4B86-9D5F-E61ADC70144D}" type="datetimeFigureOut">
               <a:rPr lang="en-US" smtClean="0"/>
-              <a:t>7/19/2021</a:t>
+              <a:t>7/20/2021</a:t>
             </a:fld>
             <a:endParaRPr lang="en-US"/>
           </a:p>
@@ -16985,7 +16991,7 @@
           <a:p>
             <a:fld id="{82EDB8D0-98ED-4B86-9D5F-E61ADC70144D}" type="datetimeFigureOut">
               <a:rPr lang="en-US" smtClean="0"/>
-              <a:t>7/19/2021</a:t>
+              <a:t>7/20/2021</a:t>
             </a:fld>
             <a:endParaRPr lang="en-US"/>
           </a:p>
@@ -17382,7 +17388,7 @@
           <a:p>
             <a:fld id="{82EDB8D0-98ED-4B86-9D5F-E61ADC70144D}" type="datetimeFigureOut">
               <a:rPr lang="en-US" smtClean="0"/>
-              <a:t>7/19/2021</a:t>
+              <a:t>7/20/2021</a:t>
             </a:fld>
             <a:endParaRPr lang="en-US"/>
           </a:p>
@@ -17977,7 +17983,7 @@
           <a:p>
             <a:fld id="{82EDB8D0-98ED-4B86-9D5F-E61ADC70144D}" type="datetimeFigureOut">
               <a:rPr lang="en-US" smtClean="0"/>
-              <a:t>7/19/2021</a:t>
+              <a:t>7/20/2021</a:t>
             </a:fld>
             <a:endParaRPr lang="en-US"/>
           </a:p>
@@ -18552,7 +18558,7 @@
           <a:p>
             <a:fld id="{82EDB8D0-98ED-4B86-9D5F-E61ADC70144D}" type="datetimeFigureOut">
               <a:rPr lang="en-US" smtClean="0"/>
-              <a:t>7/19/2021</a:t>
+              <a:t>7/20/2021</a:t>
             </a:fld>
             <a:endParaRPr lang="en-US"/>
           </a:p>
@@ -19079,7 +19085,7 @@
             <a:fld id="{82EDB8D0-98ED-4B86-9D5F-E61ADC70144D}" type="datetimeFigureOut">
               <a:rPr lang="en-US" smtClean="0"/>
               <a:pPr/>
-              <a:t>7/19/2021</a:t>
+              <a:t>7/20/2021</a:t>
             </a:fld>
             <a:endParaRPr lang="en-US" dirty="0"/>
           </a:p>
@@ -20186,6 +20192,14 @@
 <file path=ppt/slides/slide10.xml><?xml version="1.0" encoding="utf-8"?>
 <p:sld xmlns:a="http://schemas.openxmlformats.org/drawingml/2006/main" xmlns:r="http://schemas.openxmlformats.org/officeDocument/2006/relationships" xmlns:p="http://schemas.openxmlformats.org/presentationml/2006/main">
   <p:cSld>
+    <p:bg>
+      <p:bgPr>
+        <a:solidFill>
+          <a:schemeClr val="bg1"/>
+        </a:solidFill>
+        <a:effectLst/>
+      </p:bgPr>
+    </p:bg>
     <p:spTree>
       <p:nvGrpSpPr>
         <p:cNvPr id="1" name=""/>
@@ -20202,10 +20216,509 @@
       </p:grpSpPr>
       <p:sp>
         <p:nvSpPr>
+          <p:cNvPr id="26" name="Freeform: Shape 25">
+            <a:extLst>
+              <a:ext uri="{FF2B5EF4-FFF2-40B4-BE49-F238E27FC236}">
+                <a16:creationId xmlns:a16="http://schemas.microsoft.com/office/drawing/2014/main" id="{8A7BA06D-B3FF-4E91-8639-B4569AE3AA23}"/>
+              </a:ext>
+              <a:ext uri="{C183D7F6-B498-43B3-948B-1728B52AA6E4}">
+                <adec:decorative xmlns:adec="http://schemas.microsoft.com/office/drawing/2017/decorative" val="1"/>
+              </a:ext>
+            </a:extLst>
+          </p:cNvPr>
+          <p:cNvSpPr>
+            <a:spLocks noGrp="1" noRot="1" noChangeAspect="1" noMove="1" noResize="1" noEditPoints="1" noAdjustHandles="1" noChangeArrowheads="1" noChangeShapeType="1" noTextEdit="1"/>
+          </p:cNvSpPr>
+          <p:nvPr>
+            <p:extLst>
+              <p:ext uri="{386F3935-93C4-4BCD-93E2-E3B085C9AB24}">
+                <p16:designElem xmlns:p16="http://schemas.microsoft.com/office/powerpoint/2015/main" val="1"/>
+              </p:ext>
+            </p:extLst>
+          </p:nvPr>
+        </p:nvSpPr>
+        <p:spPr>
+          <a:xfrm>
+            <a:off x="10208695" y="1"/>
+            <a:ext cx="1135066" cy="477997"/>
+          </a:xfrm>
+          <a:custGeom>
+            <a:avLst/>
+            <a:gdLst/>
+            <a:ahLst/>
+            <a:cxnLst/>
+            <a:rect l="l" t="t" r="r" b="b"/>
+            <a:pathLst>
+              <a:path w="1135066" h="477997">
+                <a:moveTo>
+                  <a:pt x="0" y="0"/>
+                </a:moveTo>
+                <a:lnTo>
+                  <a:pt x="1135066" y="0"/>
+                </a:lnTo>
+                <a:lnTo>
+                  <a:pt x="1133370" y="16827"/>
+                </a:lnTo>
+                <a:cubicBezTo>
+                  <a:pt x="1079514" y="280016"/>
+                  <a:pt x="846644" y="477997"/>
+                  <a:pt x="567533" y="477997"/>
+                </a:cubicBezTo>
+                <a:cubicBezTo>
+                  <a:pt x="288422" y="477997"/>
+                  <a:pt x="55552" y="280016"/>
+                  <a:pt x="1696" y="16827"/>
+                </a:cubicBezTo>
+                <a:close/>
+              </a:path>
+            </a:pathLst>
+          </a:custGeom>
+          <a:solidFill>
+            <a:schemeClr val="accent4"/>
+          </a:solidFill>
+          <a:ln>
+            <a:noFill/>
+          </a:ln>
+        </p:spPr>
+        <p:style>
+          <a:lnRef idx="2">
+            <a:schemeClr val="accent1">
+              <a:shade val="50000"/>
+            </a:schemeClr>
+          </a:lnRef>
+          <a:fillRef idx="1">
+            <a:schemeClr val="accent1"/>
+          </a:fillRef>
+          <a:effectRef idx="0">
+            <a:schemeClr val="accent1"/>
+          </a:effectRef>
+          <a:fontRef idx="minor">
+            <a:schemeClr val="lt1"/>
+          </a:fontRef>
+        </p:style>
+        <p:txBody>
+          <a:bodyPr wrap="square" rtlCol="0" anchor="ctr">
+            <a:noAutofit/>
+          </a:bodyPr>
+          <a:lstStyle/>
+          <a:p>
+            <a:pPr marL="0" marR="0" lvl="0" indent="0" algn="ctr" defTabSz="914400" rtl="0" eaLnBrk="1" fontAlgn="auto" latinLnBrk="0" hangingPunct="1">
+              <a:lnSpc>
+                <a:spcPct val="100000"/>
+              </a:lnSpc>
+              <a:spcBef>
+                <a:spcPts val="0"/>
+              </a:spcBef>
+              <a:spcAft>
+                <a:spcPts val="0"/>
+              </a:spcAft>
+              <a:buClrTx/>
+              <a:buSzTx/>
+              <a:buFontTx/>
+              <a:buNone/>
+              <a:tabLst/>
+              <a:defRPr/>
+            </a:pPr>
+            <a:endParaRPr kumimoji="0" lang="en-US" sz="1800" b="0" i="0" u="none" strike="noStrike" kern="1200" cap="none" spc="0" normalizeH="0" baseline="0" noProof="0">
+              <a:ln>
+                <a:noFill/>
+              </a:ln>
+              <a:solidFill>
+                <a:prstClr val="white"/>
+              </a:solidFill>
+              <a:effectLst/>
+              <a:uLnTx/>
+              <a:uFillTx/>
+              <a:latin typeface="Calibri" panose="020F0502020204030204"/>
+              <a:ea typeface="+mn-ea"/>
+              <a:cs typeface="+mn-cs"/>
+            </a:endParaRPr>
+          </a:p>
+        </p:txBody>
+      </p:sp>
+      <p:sp>
+        <p:nvSpPr>
+          <p:cNvPr id="28" name="Arc 27">
+            <a:extLst>
+              <a:ext uri="{FF2B5EF4-FFF2-40B4-BE49-F238E27FC236}">
+                <a16:creationId xmlns:a16="http://schemas.microsoft.com/office/drawing/2014/main" id="{2B30C86D-5A07-48BC-9C9D-6F9A2DB1E9E1}"/>
+              </a:ext>
+              <a:ext uri="{C183D7F6-B498-43B3-948B-1728B52AA6E4}">
+                <adec:decorative xmlns:adec="http://schemas.microsoft.com/office/drawing/2017/decorative" val="1"/>
+              </a:ext>
+            </a:extLst>
+          </p:cNvPr>
+          <p:cNvSpPr>
+            <a:spLocks noGrp="1" noRot="1" noChangeAspect="1" noMove="1" noResize="1" noEditPoints="1" noAdjustHandles="1" noChangeArrowheads="1" noChangeShapeType="1" noTextEdit="1"/>
+          </p:cNvSpPr>
+          <p:nvPr>
+            <p:extLst>
+              <p:ext uri="{386F3935-93C4-4BCD-93E2-E3B085C9AB24}">
+                <p16:designElem xmlns:p16="http://schemas.microsoft.com/office/powerpoint/2015/main" val="1"/>
+              </p:ext>
+            </p:extLst>
+          </p:nvPr>
+        </p:nvSpPr>
+        <p:spPr>
+          <a:xfrm rot="10800000" flipV="1">
+            <a:off x="555710" y="1064829"/>
+            <a:ext cx="4083433" cy="4083433"/>
+          </a:xfrm>
+          <a:prstGeom prst="arc">
+            <a:avLst/>
+          </a:prstGeom>
+          <a:ln w="127000" cap="rnd">
+            <a:solidFill>
+              <a:schemeClr val="accent4"/>
+            </a:solidFill>
+            <a:prstDash val="dash"/>
+          </a:ln>
+        </p:spPr>
+        <p:style>
+          <a:lnRef idx="1">
+            <a:schemeClr val="accent1"/>
+          </a:lnRef>
+          <a:fillRef idx="0">
+            <a:schemeClr val="accent1"/>
+          </a:fillRef>
+          <a:effectRef idx="0">
+            <a:schemeClr val="accent1"/>
+          </a:effectRef>
+          <a:fontRef idx="minor">
+            <a:schemeClr val="tx1"/>
+          </a:fontRef>
+        </p:style>
+        <p:txBody>
+          <a:bodyPr rtlCol="0" anchor="ctr"/>
+          <a:lstStyle/>
+          <a:p>
+            <a:pPr marL="0" marR="0" lvl="0" indent="0" algn="ctr" defTabSz="914400" rtl="0" eaLnBrk="1" fontAlgn="auto" latinLnBrk="0" hangingPunct="1">
+              <a:lnSpc>
+                <a:spcPct val="100000"/>
+              </a:lnSpc>
+              <a:spcBef>
+                <a:spcPts val="0"/>
+              </a:spcBef>
+              <a:spcAft>
+                <a:spcPts val="0"/>
+              </a:spcAft>
+              <a:buClrTx/>
+              <a:buSzTx/>
+              <a:buFontTx/>
+              <a:buNone/>
+              <a:tabLst/>
+              <a:defRPr/>
+            </a:pPr>
+            <a:endParaRPr kumimoji="0" lang="en-US" sz="1800" b="0" i="0" u="none" strike="noStrike" kern="1200" cap="none" spc="0" normalizeH="0" baseline="0" noProof="0" dirty="0">
+              <a:ln>
+                <a:noFill/>
+              </a:ln>
+              <a:solidFill>
+                <a:prstClr val="black"/>
+              </a:solidFill>
+              <a:effectLst/>
+              <a:uLnTx/>
+              <a:uFillTx/>
+              <a:latin typeface="Calibri" panose="020F0502020204030204"/>
+              <a:ea typeface="+mn-ea"/>
+              <a:cs typeface="+mn-cs"/>
+            </a:endParaRPr>
+          </a:p>
+        </p:txBody>
+      </p:sp>
+      <p:sp useBgFill="1">
+        <p:nvSpPr>
+          <p:cNvPr id="30" name="Rectangle 29">
+            <a:extLst>
+              <a:ext uri="{FF2B5EF4-FFF2-40B4-BE49-F238E27FC236}">
+                <a16:creationId xmlns:a16="http://schemas.microsoft.com/office/drawing/2014/main" id="{F101C3BA-9804-47C4-8BCA-EC15FAD15885}"/>
+              </a:ext>
+              <a:ext uri="{C183D7F6-B498-43B3-948B-1728B52AA6E4}">
+                <adec:decorative xmlns:adec="http://schemas.microsoft.com/office/drawing/2017/decorative" val="1"/>
+              </a:ext>
+            </a:extLst>
+          </p:cNvPr>
+          <p:cNvSpPr>
+            <a:spLocks noGrp="1" noRot="1" noChangeAspect="1" noMove="1" noResize="1" noEditPoints="1" noAdjustHandles="1" noChangeArrowheads="1" noChangeShapeType="1" noTextEdit="1"/>
+          </p:cNvSpPr>
+          <p:nvPr>
+            <p:extLst>
+              <p:ext uri="{386F3935-93C4-4BCD-93E2-E3B085C9AB24}">
+                <p16:designElem xmlns:p16="http://schemas.microsoft.com/office/powerpoint/2015/main" val="1"/>
+              </p:ext>
+            </p:extLst>
+          </p:nvPr>
+        </p:nvSpPr>
+        <p:spPr>
+          <a:xfrm>
+            <a:off x="0" y="0"/>
+            <a:ext cx="12192000" cy="6858000"/>
+          </a:xfrm>
+          <a:prstGeom prst="rect">
+            <a:avLst/>
+          </a:prstGeom>
+          <a:ln w="12700" cap="flat" cmpd="sng" algn="ctr">
+            <a:noFill/>
+            <a:prstDash val="solid"/>
+            <a:miter lim="800000"/>
+          </a:ln>
+          <a:effectLst/>
+          <a:extLst>
+            <a:ext uri="{91240B29-F687-4F45-9708-019B960494DF}">
+              <a14:hiddenLine xmlns:a14="http://schemas.microsoft.com/office/drawing/2010/main" w="12700" cap="flat" cmpd="sng" algn="ctr">
+                <a:solidFill>
+                  <a:schemeClr val="accent1">
+                    <a:shade val="50000"/>
+                  </a:schemeClr>
+                </a:solidFill>
+                <a:prstDash val="solid"/>
+                <a:miter lim="800000"/>
+              </a14:hiddenLine>
+            </a:ext>
+          </a:extLst>
+        </p:spPr>
+        <p:style>
+          <a:lnRef idx="2">
+            <a:schemeClr val="accent1">
+              <a:shade val="50000"/>
+            </a:schemeClr>
+          </a:lnRef>
+          <a:fillRef idx="1">
+            <a:schemeClr val="accent1"/>
+          </a:fillRef>
+          <a:effectRef idx="0">
+            <a:schemeClr val="accent1"/>
+          </a:effectRef>
+          <a:fontRef idx="minor">
+            <a:schemeClr val="lt1"/>
+          </a:fontRef>
+        </p:style>
+        <p:txBody>
+          <a:bodyPr rtlCol="0" anchor="ctr"/>
+          <a:lstStyle/>
+          <a:p>
+            <a:pPr algn="ctr"/>
+            <a:endParaRPr lang="en-US"/>
+          </a:p>
+        </p:txBody>
+      </p:sp>
+      <p:pic>
+        <p:nvPicPr>
+          <p:cNvPr id="5" name="Picture 4" descr="Graphs on a display with reflection of office">
+            <a:extLst>
+              <a:ext uri="{FF2B5EF4-FFF2-40B4-BE49-F238E27FC236}">
+                <a16:creationId xmlns:a16="http://schemas.microsoft.com/office/drawing/2014/main" id="{F2438316-901D-4DF4-A398-32CB0F4AE951}"/>
+              </a:ext>
+            </a:extLst>
+          </p:cNvPr>
+          <p:cNvPicPr>
+            <a:picLocks noChangeAspect="1"/>
+          </p:cNvPicPr>
+          <p:nvPr/>
+        </p:nvPicPr>
+        <p:blipFill rotWithShape="1">
+          <a:blip r:embed="rId2"/>
+          <a:srcRect t="10245" r="-1" b="5463"/>
+          <a:stretch/>
+        </p:blipFill>
+        <p:spPr>
+          <a:xfrm>
+            <a:off x="20" y="10"/>
+            <a:ext cx="12188932" cy="6857989"/>
+          </a:xfrm>
+          <a:prstGeom prst="rect">
+            <a:avLst/>
+          </a:prstGeom>
+        </p:spPr>
+      </p:pic>
+      <p:sp useBgFill="1">
+        <p:nvSpPr>
+          <p:cNvPr id="32" name="Rectangle 31">
+            <a:extLst>
+              <a:ext uri="{FF2B5EF4-FFF2-40B4-BE49-F238E27FC236}">
+                <a16:creationId xmlns:a16="http://schemas.microsoft.com/office/drawing/2014/main" id="{A34066D6-1B59-4642-A86D-39464CEE971B}"/>
+              </a:ext>
+              <a:ext uri="{C183D7F6-B498-43B3-948B-1728B52AA6E4}">
+                <adec:decorative xmlns:adec="http://schemas.microsoft.com/office/drawing/2017/decorative" val="1"/>
+              </a:ext>
+            </a:extLst>
+          </p:cNvPr>
+          <p:cNvSpPr>
+            <a:spLocks noGrp="1" noRot="1" noChangeAspect="1" noMove="1" noResize="1" noEditPoints="1" noAdjustHandles="1" noChangeArrowheads="1" noChangeShapeType="1" noTextEdit="1"/>
+          </p:cNvSpPr>
+          <p:nvPr>
+            <p:extLst>
+              <p:ext uri="{386F3935-93C4-4BCD-93E2-E3B085C9AB24}">
+                <p16:designElem xmlns:p16="http://schemas.microsoft.com/office/powerpoint/2015/main" val="1"/>
+              </p:ext>
+            </p:extLst>
+          </p:nvPr>
+        </p:nvSpPr>
+        <p:spPr>
+          <a:xfrm>
+            <a:off x="-3048" y="-4"/>
+            <a:ext cx="4712144" cy="6858004"/>
+          </a:xfrm>
+          <a:prstGeom prst="rect">
+            <a:avLst/>
+          </a:prstGeom>
+          <a:ln>
+            <a:noFill/>
+          </a:ln>
+        </p:spPr>
+        <p:style>
+          <a:lnRef idx="2">
+            <a:schemeClr val="accent1">
+              <a:shade val="50000"/>
+            </a:schemeClr>
+          </a:lnRef>
+          <a:fillRef idx="1">
+            <a:schemeClr val="accent1"/>
+          </a:fillRef>
+          <a:effectRef idx="0">
+            <a:schemeClr val="accent1"/>
+          </a:effectRef>
+          <a:fontRef idx="minor">
+            <a:schemeClr val="lt1"/>
+          </a:fontRef>
+        </p:style>
+        <p:txBody>
+          <a:bodyPr rtlCol="0" anchor="ctr"/>
+          <a:lstStyle/>
+          <a:p>
+            <a:pPr marL="0" marR="0" lvl="0" indent="0" algn="ctr" defTabSz="914400" rtl="0" eaLnBrk="1" fontAlgn="auto" latinLnBrk="0" hangingPunct="1">
+              <a:lnSpc>
+                <a:spcPct val="100000"/>
+              </a:lnSpc>
+              <a:spcBef>
+                <a:spcPts val="0"/>
+              </a:spcBef>
+              <a:spcAft>
+                <a:spcPts val="0"/>
+              </a:spcAft>
+              <a:buClrTx/>
+              <a:buSzTx/>
+              <a:buFontTx/>
+              <a:buNone/>
+              <a:tabLst/>
+              <a:defRPr/>
+            </a:pPr>
+            <a:endParaRPr kumimoji="0" lang="en-US" sz="1800" b="0" i="0" u="none" strike="noStrike" kern="1200" cap="none" spc="0" normalizeH="0" baseline="0" noProof="0">
+              <a:ln>
+                <a:noFill/>
+              </a:ln>
+              <a:solidFill>
+                <a:prstClr val="white"/>
+              </a:solidFill>
+              <a:effectLst/>
+              <a:uLnTx/>
+              <a:uFillTx/>
+              <a:latin typeface="Calibri" panose="020F0502020204030204"/>
+              <a:ea typeface="+mn-ea"/>
+              <a:cs typeface="+mn-cs"/>
+            </a:endParaRPr>
+          </a:p>
+        </p:txBody>
+      </p:sp>
+      <p:sp>
+        <p:nvSpPr>
+          <p:cNvPr id="34" name="Arc 33">
+            <a:extLst>
+              <a:ext uri="{FF2B5EF4-FFF2-40B4-BE49-F238E27FC236}">
+                <a16:creationId xmlns:a16="http://schemas.microsoft.com/office/drawing/2014/main" id="{18E928D9-3091-4385-B979-265D55AD02CE}"/>
+              </a:ext>
+              <a:ext uri="{C183D7F6-B498-43B3-948B-1728B52AA6E4}">
+                <adec:decorative xmlns:adec="http://schemas.microsoft.com/office/drawing/2017/decorative" val="1"/>
+              </a:ext>
+            </a:extLst>
+          </p:cNvPr>
+          <p:cNvSpPr>
+            <a:spLocks noGrp="1" noRot="1" noChangeAspect="1" noMove="1" noResize="1" noEditPoints="1" noAdjustHandles="1" noChangeArrowheads="1" noChangeShapeType="1" noTextEdit="1"/>
+          </p:cNvSpPr>
+          <p:nvPr>
+            <p:extLst>
+              <p:ext uri="{386F3935-93C4-4BCD-93E2-E3B085C9AB24}">
+                <p16:designElem xmlns:p16="http://schemas.microsoft.com/office/powerpoint/2015/main" val="1"/>
+              </p:ext>
+            </p:extLst>
+          </p:nvPr>
+        </p:nvSpPr>
+        <p:spPr>
+          <a:xfrm rot="303011">
+            <a:off x="1155661" y="700861"/>
+            <a:ext cx="2987899" cy="2987899"/>
+          </a:xfrm>
+          <a:prstGeom prst="arc">
+            <a:avLst>
+              <a:gd name="adj1" fmla="val 14612914"/>
+              <a:gd name="adj2" fmla="val 0"/>
+            </a:avLst>
+          </a:prstGeom>
+          <a:ln w="127000" cap="rnd">
+            <a:solidFill>
+              <a:schemeClr val="accent4"/>
+            </a:solidFill>
+            <a:prstDash val="dash"/>
+          </a:ln>
+        </p:spPr>
+        <p:style>
+          <a:lnRef idx="1">
+            <a:schemeClr val="accent1"/>
+          </a:lnRef>
+          <a:fillRef idx="0">
+            <a:schemeClr val="accent1"/>
+          </a:fillRef>
+          <a:effectRef idx="0">
+            <a:schemeClr val="accent1"/>
+          </a:effectRef>
+          <a:fontRef idx="minor">
+            <a:schemeClr val="tx1"/>
+          </a:fontRef>
+        </p:style>
+        <p:txBody>
+          <a:bodyPr rtlCol="0" anchor="ctr"/>
+          <a:lstStyle/>
+          <a:p>
+            <a:pPr marL="0" marR="0" lvl="0" indent="0" algn="ctr" defTabSz="914400" rtl="0" eaLnBrk="1" fontAlgn="auto" latinLnBrk="0" hangingPunct="1">
+              <a:lnSpc>
+                <a:spcPct val="100000"/>
+              </a:lnSpc>
+              <a:spcBef>
+                <a:spcPts val="0"/>
+              </a:spcBef>
+              <a:spcAft>
+                <a:spcPts val="0"/>
+              </a:spcAft>
+              <a:buClrTx/>
+              <a:buSzTx/>
+              <a:buFontTx/>
+              <a:buNone/>
+              <a:tabLst/>
+              <a:defRPr/>
+            </a:pPr>
+            <a:endParaRPr kumimoji="0" lang="en-US" sz="1800" b="0" i="0" u="none" strike="noStrike" kern="1200" cap="none" spc="0" normalizeH="0" baseline="0" noProof="0">
+              <a:ln>
+                <a:noFill/>
+              </a:ln>
+              <a:solidFill>
+                <a:srgbClr val="000000"/>
+              </a:solidFill>
+              <a:effectLst/>
+              <a:uLnTx/>
+              <a:uFillTx/>
+              <a:latin typeface="Calibri" panose="020F0502020204030204"/>
+              <a:ea typeface="+mn-ea"/>
+              <a:cs typeface="+mn-cs"/>
+            </a:endParaRPr>
+          </a:p>
+        </p:txBody>
+      </p:sp>
+      <p:sp>
+        <p:nvSpPr>
           <p:cNvPr id="2" name="Titre 1">
             <a:extLst>
               <a:ext uri="{FF2B5EF4-FFF2-40B4-BE49-F238E27FC236}">
-                <a16:creationId xmlns:a16="http://schemas.microsoft.com/office/drawing/2014/main" id="{F9045010-0E32-404D-B01D-2F04CE1A1029}"/>
+                <a16:creationId xmlns:a16="http://schemas.microsoft.com/office/drawing/2014/main" id="{DF6D2867-1365-4479-B903-7D2D530B4AC6}"/>
               </a:ext>
             </a:extLst>
           </p:cNvPr>
@@ -20216,46 +20729,254 @@
             <p:ph type="title"/>
           </p:nvPr>
         </p:nvSpPr>
-        <p:spPr/>
+        <p:spPr>
+          <a:xfrm>
+            <a:off x="643468" y="795509"/>
+            <a:ext cx="3489261" cy="2798604"/>
+          </a:xfrm>
+        </p:spPr>
         <p:txBody>
-          <a:bodyPr/>
+          <a:bodyPr vert="horz" lIns="91440" tIns="45720" rIns="91440" bIns="45720" rtlCol="0" anchor="b">
+            <a:normAutofit/>
+          </a:bodyPr>
           <a:lstStyle/>
           <a:p>
-            <a:endParaRPr lang="fr-FR"/>
+            <a:pPr algn="ctr"/>
+            <a:r>
+              <a:rPr lang="en-US" sz="5000" kern="1200" dirty="0" err="1">
+                <a:solidFill>
+                  <a:schemeClr val="tx1"/>
+                </a:solidFill>
+                <a:latin typeface="+mj-lt"/>
+                <a:ea typeface="+mj-ea"/>
+                <a:cs typeface="+mj-cs"/>
+              </a:rPr>
+              <a:t>Traitement</a:t>
+            </a:r>
+            <a:r>
+              <a:rPr lang="en-US" sz="5000" kern="1200" dirty="0">
+                <a:solidFill>
+                  <a:schemeClr val="tx1"/>
+                </a:solidFill>
+                <a:latin typeface="+mj-lt"/>
+                <a:ea typeface="+mj-ea"/>
+                <a:cs typeface="+mj-cs"/>
+              </a:rPr>
+              <a:t> du jeu de </a:t>
+            </a:r>
+            <a:r>
+              <a:rPr lang="en-US" sz="5000" kern="1200" dirty="0" err="1">
+                <a:solidFill>
+                  <a:schemeClr val="tx1"/>
+                </a:solidFill>
+                <a:latin typeface="+mj-lt"/>
+                <a:ea typeface="+mj-ea"/>
+                <a:cs typeface="+mj-cs"/>
+              </a:rPr>
+              <a:t>données</a:t>
+            </a:r>
+            <a:endParaRPr lang="en-US" sz="5000" kern="1200" dirty="0">
+              <a:solidFill>
+                <a:schemeClr val="tx1"/>
+              </a:solidFill>
+              <a:latin typeface="+mj-lt"/>
+              <a:ea typeface="+mj-ea"/>
+              <a:cs typeface="+mj-cs"/>
+            </a:endParaRPr>
           </a:p>
         </p:txBody>
       </p:sp>
       <p:sp>
         <p:nvSpPr>
-          <p:cNvPr id="3" name="Espace réservé du contenu 2">
+          <p:cNvPr id="36" name="Oval 35">
             <a:extLst>
               <a:ext uri="{FF2B5EF4-FFF2-40B4-BE49-F238E27FC236}">
-                <a16:creationId xmlns:a16="http://schemas.microsoft.com/office/drawing/2014/main" id="{A0329E09-F86B-4497-9DC9-D5DDDAAD13C3}"/>
+                <a16:creationId xmlns:a16="http://schemas.microsoft.com/office/drawing/2014/main" id="{7D602432-D774-4CF5-94E8-7D52D01059D2}"/>
+              </a:ext>
+              <a:ext uri="{C183D7F6-B498-43B3-948B-1728B52AA6E4}">
+                <adec:decorative xmlns:adec="http://schemas.microsoft.com/office/drawing/2017/decorative" val="1"/>
               </a:ext>
             </a:extLst>
           </p:cNvPr>
           <p:cNvSpPr>
-            <a:spLocks noGrp="1"/>
+            <a:spLocks noGrp="1" noRot="1" noChangeAspect="1" noMove="1" noResize="1" noEditPoints="1" noAdjustHandles="1" noChangeArrowheads="1" noChangeShapeType="1" noTextEdit="1"/>
           </p:cNvSpPr>
           <p:nvPr>
-            <p:ph idx="1"/>
+            <p:extLst>
+              <p:ext uri="{386F3935-93C4-4BCD-93E2-E3B085C9AB24}">
+                <p16:designElem xmlns:p16="http://schemas.microsoft.com/office/powerpoint/2015/main" val="1"/>
+              </p:ext>
+            </p:extLst>
           </p:nvPr>
         </p:nvSpPr>
-        <p:spPr/>
+        <p:spPr>
+          <a:xfrm>
+            <a:off x="638194" y="4626633"/>
+            <a:ext cx="491961" cy="491961"/>
+          </a:xfrm>
+          <a:prstGeom prst="ellipse">
+            <a:avLst/>
+          </a:prstGeom>
+          <a:solidFill>
+            <a:schemeClr val="accent5"/>
+          </a:solidFill>
+          <a:ln>
+            <a:noFill/>
+          </a:ln>
+        </p:spPr>
+        <p:style>
+          <a:lnRef idx="2">
+            <a:schemeClr val="accent1">
+              <a:shade val="50000"/>
+            </a:schemeClr>
+          </a:lnRef>
+          <a:fillRef idx="1">
+            <a:schemeClr val="accent1"/>
+          </a:fillRef>
+          <a:effectRef idx="0">
+            <a:schemeClr val="accent1"/>
+          </a:effectRef>
+          <a:fontRef idx="minor">
+            <a:schemeClr val="lt1"/>
+          </a:fontRef>
+        </p:style>
         <p:txBody>
-          <a:bodyPr/>
+          <a:bodyPr rtlCol="0" anchor="ctr"/>
           <a:lstStyle/>
           <a:p>
-            <a:endParaRPr lang="fr-FR"/>
+            <a:pPr marL="0" marR="0" lvl="0" indent="0" algn="ctr" defTabSz="914400" rtl="0" eaLnBrk="1" fontAlgn="auto" latinLnBrk="0" hangingPunct="1">
+              <a:lnSpc>
+                <a:spcPct val="100000"/>
+              </a:lnSpc>
+              <a:spcBef>
+                <a:spcPts val="0"/>
+              </a:spcBef>
+              <a:spcAft>
+                <a:spcPts val="0"/>
+              </a:spcAft>
+              <a:buClrTx/>
+              <a:buSzTx/>
+              <a:buFontTx/>
+              <a:buNone/>
+              <a:tabLst/>
+              <a:defRPr/>
+            </a:pPr>
+            <a:endParaRPr kumimoji="0" lang="en-US" sz="1800" b="0" i="0" u="none" strike="noStrike" kern="1200" cap="none" spc="0" normalizeH="0" baseline="0" noProof="0">
+              <a:ln>
+                <a:noFill/>
+              </a:ln>
+              <a:solidFill>
+                <a:srgbClr val="FFFFFF"/>
+              </a:solidFill>
+              <a:effectLst/>
+              <a:uLnTx/>
+              <a:uFillTx/>
+              <a:latin typeface="Calibri" panose="020F0502020204030204"/>
+              <a:ea typeface="+mn-ea"/>
+              <a:cs typeface="+mn-cs"/>
+            </a:endParaRPr>
+          </a:p>
+        </p:txBody>
+      </p:sp>
+      <p:sp>
+        <p:nvSpPr>
+          <p:cNvPr id="38" name="Rectangle 37">
+            <a:extLst>
+              <a:ext uri="{FF2B5EF4-FFF2-40B4-BE49-F238E27FC236}">
+                <a16:creationId xmlns:a16="http://schemas.microsoft.com/office/drawing/2014/main" id="{CBF9EBB4-5078-47B2-AAA0-DF4A88D8182A}"/>
+              </a:ext>
+              <a:ext uri="{C183D7F6-B498-43B3-948B-1728B52AA6E4}">
+                <adec:decorative xmlns:adec="http://schemas.microsoft.com/office/drawing/2017/decorative" val="1"/>
+              </a:ext>
+            </a:extLst>
+          </p:cNvPr>
+          <p:cNvSpPr>
+            <a:spLocks noGrp="1" noRot="1" noChangeAspect="1" noMove="1" noResize="1" noEditPoints="1" noAdjustHandles="1" noChangeArrowheads="1" noChangeShapeType="1" noTextEdit="1"/>
+          </p:cNvSpPr>
+          <p:nvPr>
+            <p:extLst>
+              <p:ext uri="{386F3935-93C4-4BCD-93E2-E3B085C9AB24}">
+                <p16:designElem xmlns:p16="http://schemas.microsoft.com/office/powerpoint/2015/main" val="1"/>
+              </p:ext>
+            </p:extLst>
+          </p:nvPr>
+        </p:nvSpPr>
+        <p:spPr>
+          <a:xfrm>
+            <a:off x="4364940" y="5011563"/>
+            <a:ext cx="731558" cy="731558"/>
+          </a:xfrm>
+          <a:prstGeom prst="rect">
+            <a:avLst/>
+          </a:prstGeom>
+          <a:noFill/>
+          <a:ln w="127000">
+            <a:solidFill>
+              <a:schemeClr val="accent6"/>
+            </a:solidFill>
+            <a:round/>
+          </a:ln>
+        </p:spPr>
+        <p:style>
+          <a:lnRef idx="2">
+            <a:schemeClr val="accent1">
+              <a:shade val="50000"/>
+            </a:schemeClr>
+          </a:lnRef>
+          <a:fillRef idx="1">
+            <a:schemeClr val="accent1"/>
+          </a:fillRef>
+          <a:effectRef idx="0">
+            <a:schemeClr val="accent1"/>
+          </a:effectRef>
+          <a:fontRef idx="minor">
+            <a:schemeClr val="lt1"/>
+          </a:fontRef>
+        </p:style>
+        <p:txBody>
+          <a:bodyPr rtlCol="0" anchor="ctr"/>
+          <a:lstStyle/>
+          <a:p>
+            <a:pPr marL="0" marR="0" lvl="0" indent="0" algn="ctr" defTabSz="914400" rtl="0" eaLnBrk="1" fontAlgn="auto" latinLnBrk="0" hangingPunct="1">
+              <a:lnSpc>
+                <a:spcPct val="100000"/>
+              </a:lnSpc>
+              <a:spcBef>
+                <a:spcPts val="0"/>
+              </a:spcBef>
+              <a:spcAft>
+                <a:spcPts val="0"/>
+              </a:spcAft>
+              <a:buClrTx/>
+              <a:buSzTx/>
+              <a:buFontTx/>
+              <a:buNone/>
+              <a:tabLst/>
+              <a:defRPr/>
+            </a:pPr>
+            <a:endParaRPr kumimoji="0" lang="en-US" sz="1800" b="0" i="0" u="none" strike="noStrike" kern="1200" cap="none" spc="0" normalizeH="0" baseline="0" noProof="0">
+              <a:ln>
+                <a:noFill/>
+              </a:ln>
+              <a:solidFill>
+                <a:srgbClr val="FFFFFF"/>
+              </a:solidFill>
+              <a:effectLst/>
+              <a:uLnTx/>
+              <a:uFillTx/>
+              <a:latin typeface="Calibri" panose="020F0502020204030204"/>
+              <a:ea typeface="+mn-ea"/>
+              <a:cs typeface="+mn-cs"/>
+            </a:endParaRPr>
           </a:p>
         </p:txBody>
       </p:sp>
       <p:pic>
         <p:nvPicPr>
-          <p:cNvPr id="4" name="Image 3">
+          <p:cNvPr id="20" name="Image 19">
             <a:extLst>
               <a:ext uri="{FF2B5EF4-FFF2-40B4-BE49-F238E27FC236}">
-                <a16:creationId xmlns:a16="http://schemas.microsoft.com/office/drawing/2014/main" id="{B54B5F13-A4E8-4F2A-A163-D7F713A9FA4F}"/>
+                <a16:creationId xmlns:a16="http://schemas.microsoft.com/office/drawing/2014/main" id="{74307612-1E8D-4A08-A276-65E926623876}"/>
               </a:ext>
             </a:extLst>
           </p:cNvPr>
@@ -20265,7 +20986,7 @@
           <p:nvPr/>
         </p:nvPicPr>
         <p:blipFill>
-          <a:blip r:embed="rId2">
+          <a:blip r:embed="rId3">
             <a:extLst>
               <a:ext uri="{28A0092B-C50C-407E-A947-70E740481C1C}">
                 <a14:useLocalDpi xmlns:a14="http://schemas.microsoft.com/office/drawing/2010/main" val="0"/>
@@ -20289,7 +21010,7 @@
     </p:spTree>
     <p:extLst>
       <p:ext uri="{BB962C8B-B14F-4D97-AF65-F5344CB8AC3E}">
-        <p14:creationId xmlns:p14="http://schemas.microsoft.com/office/powerpoint/2010/main" val="706762177"/>
+        <p14:creationId xmlns:p14="http://schemas.microsoft.com/office/powerpoint/2010/main" val="699059219"/>
       </p:ext>
     </p:extLst>
   </p:cSld>
@@ -20321,7 +21042,7 @@
           <p:cNvPr id="2" name="Titre 1">
             <a:extLst>
               <a:ext uri="{FF2B5EF4-FFF2-40B4-BE49-F238E27FC236}">
-                <a16:creationId xmlns:a16="http://schemas.microsoft.com/office/drawing/2014/main" id="{ED91FCDF-5383-4058-80DD-723117E84994}"/>
+                <a16:creationId xmlns:a16="http://schemas.microsoft.com/office/drawing/2014/main" id="{F9045010-0E32-404D-B01D-2F04CE1A1029}"/>
               </a:ext>
             </a:extLst>
           </p:cNvPr>
@@ -20337,7 +21058,166 @@
           <a:bodyPr/>
           <a:lstStyle/>
           <a:p>
-            <a:endParaRPr lang="fr-FR"/>
+            <a:r>
+              <a:rPr lang="fr-FR" dirty="0" err="1"/>
+              <a:t>Outlier</a:t>
+            </a:r>
+            <a:endParaRPr lang="fr-FR" dirty="0"/>
+          </a:p>
+        </p:txBody>
+      </p:sp>
+      <p:pic>
+        <p:nvPicPr>
+          <p:cNvPr id="4" name="Image 3">
+            <a:extLst>
+              <a:ext uri="{FF2B5EF4-FFF2-40B4-BE49-F238E27FC236}">
+                <a16:creationId xmlns:a16="http://schemas.microsoft.com/office/drawing/2014/main" id="{B54B5F13-A4E8-4F2A-A163-D7F713A9FA4F}"/>
+              </a:ext>
+            </a:extLst>
+          </p:cNvPr>
+          <p:cNvPicPr>
+            <a:picLocks noChangeAspect="1"/>
+          </p:cNvPicPr>
+          <p:nvPr/>
+        </p:nvPicPr>
+        <p:blipFill>
+          <a:blip r:embed="rId2">
+            <a:extLst>
+              <a:ext uri="{28A0092B-C50C-407E-A947-70E740481C1C}">
+                <a14:useLocalDpi xmlns:a14="http://schemas.microsoft.com/office/drawing/2010/main" val="0"/>
+              </a:ext>
+            </a:extLst>
+          </a:blip>
+          <a:stretch>
+            <a:fillRect/>
+          </a:stretch>
+        </p:blipFill>
+        <p:spPr>
+          <a:xfrm>
+            <a:off x="11476815" y="6204306"/>
+            <a:ext cx="712136" cy="653693"/>
+          </a:xfrm>
+          <a:prstGeom prst="rect">
+            <a:avLst/>
+          </a:prstGeom>
+        </p:spPr>
+      </p:pic>
+      <p:pic>
+        <p:nvPicPr>
+          <p:cNvPr id="5" name="Espace réservé du contenu 3">
+            <a:extLst>
+              <a:ext uri="{FF2B5EF4-FFF2-40B4-BE49-F238E27FC236}">
+                <a16:creationId xmlns:a16="http://schemas.microsoft.com/office/drawing/2014/main" id="{452036B4-5A9F-46BC-B292-27714355A1AB}"/>
+              </a:ext>
+            </a:extLst>
+          </p:cNvPr>
+          <p:cNvPicPr>
+            <a:picLocks noGrp="1" noChangeAspect="1"/>
+          </p:cNvPicPr>
+          <p:nvPr>
+            <p:ph idx="1"/>
+          </p:nvPr>
+        </p:nvPicPr>
+        <p:blipFill>
+          <a:blip r:embed="rId3"/>
+          <a:stretch>
+            <a:fillRect/>
+          </a:stretch>
+        </p:blipFill>
+        <p:spPr>
+          <a:xfrm>
+            <a:off x="838200" y="2384698"/>
+            <a:ext cx="10515600" cy="2741066"/>
+          </a:xfrm>
+          <a:prstGeom prst="rect">
+            <a:avLst/>
+          </a:prstGeom>
+        </p:spPr>
+      </p:pic>
+      <p:pic>
+        <p:nvPicPr>
+          <p:cNvPr id="7" name="Image 6">
+            <a:extLst>
+              <a:ext uri="{FF2B5EF4-FFF2-40B4-BE49-F238E27FC236}">
+                <a16:creationId xmlns:a16="http://schemas.microsoft.com/office/drawing/2014/main" id="{D57A50D9-201D-48C0-8D54-5FCE94C5A067}"/>
+              </a:ext>
+            </a:extLst>
+          </p:cNvPr>
+          <p:cNvPicPr>
+            <a:picLocks noChangeAspect="1"/>
+          </p:cNvPicPr>
+          <p:nvPr/>
+        </p:nvPicPr>
+        <p:blipFill rotWithShape="1">
+          <a:blip r:embed="rId4"/>
+          <a:srcRect l="301" r="8223" b="7490"/>
+          <a:stretch/>
+        </p:blipFill>
+        <p:spPr>
+          <a:xfrm>
+            <a:off x="1020417" y="2564675"/>
+            <a:ext cx="3373057" cy="2468880"/>
+          </a:xfrm>
+          <a:prstGeom prst="rect">
+            <a:avLst/>
+          </a:prstGeom>
+        </p:spPr>
+      </p:pic>
+    </p:spTree>
+    <p:extLst>
+      <p:ext uri="{BB962C8B-B14F-4D97-AF65-F5344CB8AC3E}">
+        <p14:creationId xmlns:p14="http://schemas.microsoft.com/office/powerpoint/2010/main" val="706762177"/>
+      </p:ext>
+    </p:extLst>
+  </p:cSld>
+  <p:clrMapOvr>
+    <a:masterClrMapping/>
+  </p:clrMapOvr>
+</p:sld>
+</file>
+
+<file path=ppt/slides/slide12.xml><?xml version="1.0" encoding="utf-8"?>
+<p:sld xmlns:a="http://schemas.openxmlformats.org/drawingml/2006/main" xmlns:r="http://schemas.openxmlformats.org/officeDocument/2006/relationships" xmlns:p="http://schemas.openxmlformats.org/presentationml/2006/main">
+  <p:cSld>
+    <p:spTree>
+      <p:nvGrpSpPr>
+        <p:cNvPr id="1" name=""/>
+        <p:cNvGrpSpPr/>
+        <p:nvPr/>
+      </p:nvGrpSpPr>
+      <p:grpSpPr>
+        <a:xfrm>
+          <a:off x="0" y="0"/>
+          <a:ext cx="0" cy="0"/>
+          <a:chOff x="0" y="0"/>
+          <a:chExt cx="0" cy="0"/>
+        </a:xfrm>
+      </p:grpSpPr>
+      <p:sp>
+        <p:nvSpPr>
+          <p:cNvPr id="2" name="Titre 1">
+            <a:extLst>
+              <a:ext uri="{FF2B5EF4-FFF2-40B4-BE49-F238E27FC236}">
+                <a16:creationId xmlns:a16="http://schemas.microsoft.com/office/drawing/2014/main" id="{ED91FCDF-5383-4058-80DD-723117E84994}"/>
+              </a:ext>
+            </a:extLst>
+          </p:cNvPr>
+          <p:cNvSpPr>
+            <a:spLocks noGrp="1"/>
+          </p:cNvSpPr>
+          <p:nvPr>
+            <p:ph type="title"/>
+          </p:nvPr>
+        </p:nvSpPr>
+        <p:spPr/>
+        <p:txBody>
+          <a:bodyPr/>
+          <a:lstStyle/>
+          <a:p>
+            <a:r>
+              <a:rPr lang="fr-FR" dirty="0"/>
+              <a:t>Imputation</a:t>
+            </a:r>
           </a:p>
         </p:txBody>
       </p:sp>
@@ -20415,7 +21295,256 @@
 </p:sld>
 </file>
 
-<file path=ppt/slides/slide12.xml><?xml version="1.0" encoding="utf-8"?>
+<file path=ppt/slides/slide13.xml><?xml version="1.0" encoding="utf-8"?>
+<p:sld xmlns:a="http://schemas.openxmlformats.org/drawingml/2006/main" xmlns:r="http://schemas.openxmlformats.org/officeDocument/2006/relationships" xmlns:p="http://schemas.openxmlformats.org/presentationml/2006/main">
+  <p:cSld>
+    <p:spTree>
+      <p:nvGrpSpPr>
+        <p:cNvPr id="1" name=""/>
+        <p:cNvGrpSpPr/>
+        <p:nvPr/>
+      </p:nvGrpSpPr>
+      <p:grpSpPr>
+        <a:xfrm>
+          <a:off x="0" y="0"/>
+          <a:ext cx="0" cy="0"/>
+          <a:chOff x="0" y="0"/>
+          <a:chExt cx="0" cy="0"/>
+        </a:xfrm>
+      </p:grpSpPr>
+      <p:sp>
+        <p:nvSpPr>
+          <p:cNvPr id="2" name="Titre 1">
+            <a:extLst>
+              <a:ext uri="{FF2B5EF4-FFF2-40B4-BE49-F238E27FC236}">
+                <a16:creationId xmlns:a16="http://schemas.microsoft.com/office/drawing/2014/main" id="{2321A7E2-7E4E-4A40-9ED1-BC2D8E8D2A07}"/>
+              </a:ext>
+            </a:extLst>
+          </p:cNvPr>
+          <p:cNvSpPr>
+            <a:spLocks noGrp="1"/>
+          </p:cNvSpPr>
+          <p:nvPr>
+            <p:ph type="title"/>
+          </p:nvPr>
+        </p:nvSpPr>
+        <p:spPr/>
+        <p:txBody>
+          <a:bodyPr/>
+          <a:lstStyle/>
+          <a:p>
+            <a:r>
+              <a:rPr lang="fr-FR" dirty="0"/>
+              <a:t>Données catégorielles</a:t>
+            </a:r>
+          </a:p>
+        </p:txBody>
+      </p:sp>
+      <p:sp>
+        <p:nvSpPr>
+          <p:cNvPr id="3" name="Espace réservé du contenu 2">
+            <a:extLst>
+              <a:ext uri="{FF2B5EF4-FFF2-40B4-BE49-F238E27FC236}">
+                <a16:creationId xmlns:a16="http://schemas.microsoft.com/office/drawing/2014/main" id="{B3867FFB-DBF4-4421-9A5B-4B7A140C7436}"/>
+              </a:ext>
+            </a:extLst>
+          </p:cNvPr>
+          <p:cNvSpPr>
+            <a:spLocks noGrp="1"/>
+          </p:cNvSpPr>
+          <p:nvPr>
+            <p:ph idx="1"/>
+          </p:nvPr>
+        </p:nvSpPr>
+        <p:spPr/>
+        <p:txBody>
+          <a:bodyPr/>
+          <a:lstStyle/>
+          <a:p>
+            <a:endParaRPr lang="fr-FR"/>
+          </a:p>
+        </p:txBody>
+      </p:sp>
+    </p:spTree>
+    <p:extLst>
+      <p:ext uri="{BB962C8B-B14F-4D97-AF65-F5344CB8AC3E}">
+        <p14:creationId xmlns:p14="http://schemas.microsoft.com/office/powerpoint/2010/main" val="556689920"/>
+      </p:ext>
+    </p:extLst>
+  </p:cSld>
+  <p:clrMapOvr>
+    <a:masterClrMapping/>
+  </p:clrMapOvr>
+</p:sld>
+</file>
+
+<file path=ppt/slides/slide14.xml><?xml version="1.0" encoding="utf-8"?>
+<p:sld xmlns:a="http://schemas.openxmlformats.org/drawingml/2006/main" xmlns:r="http://schemas.openxmlformats.org/officeDocument/2006/relationships" xmlns:p="http://schemas.openxmlformats.org/presentationml/2006/main">
+  <p:cSld>
+    <p:spTree>
+      <p:nvGrpSpPr>
+        <p:cNvPr id="1" name=""/>
+        <p:cNvGrpSpPr/>
+        <p:nvPr/>
+      </p:nvGrpSpPr>
+      <p:grpSpPr>
+        <a:xfrm>
+          <a:off x="0" y="0"/>
+          <a:ext cx="0" cy="0"/>
+          <a:chOff x="0" y="0"/>
+          <a:chExt cx="0" cy="0"/>
+        </a:xfrm>
+      </p:grpSpPr>
+      <p:sp>
+        <p:nvSpPr>
+          <p:cNvPr id="2" name="Titre 1">
+            <a:extLst>
+              <a:ext uri="{FF2B5EF4-FFF2-40B4-BE49-F238E27FC236}">
+                <a16:creationId xmlns:a16="http://schemas.microsoft.com/office/drawing/2014/main" id="{90F33465-1A94-426A-BA96-7CEDC66812D0}"/>
+              </a:ext>
+            </a:extLst>
+          </p:cNvPr>
+          <p:cNvSpPr>
+            <a:spLocks noGrp="1"/>
+          </p:cNvSpPr>
+          <p:nvPr>
+            <p:ph type="title"/>
+          </p:nvPr>
+        </p:nvSpPr>
+        <p:spPr/>
+        <p:txBody>
+          <a:bodyPr/>
+          <a:lstStyle/>
+          <a:p>
+            <a:r>
+              <a:rPr lang="fr-FR" dirty="0"/>
+              <a:t>Création de nouvelles colonnes</a:t>
+            </a:r>
+          </a:p>
+        </p:txBody>
+      </p:sp>
+      <p:sp>
+        <p:nvSpPr>
+          <p:cNvPr id="3" name="Espace réservé du contenu 2">
+            <a:extLst>
+              <a:ext uri="{FF2B5EF4-FFF2-40B4-BE49-F238E27FC236}">
+                <a16:creationId xmlns:a16="http://schemas.microsoft.com/office/drawing/2014/main" id="{5E32D9A5-4E18-4D80-859D-524EFA94C960}"/>
+              </a:ext>
+            </a:extLst>
+          </p:cNvPr>
+          <p:cNvSpPr>
+            <a:spLocks noGrp="1"/>
+          </p:cNvSpPr>
+          <p:nvPr>
+            <p:ph idx="1"/>
+          </p:nvPr>
+        </p:nvSpPr>
+        <p:spPr/>
+        <p:txBody>
+          <a:bodyPr/>
+          <a:lstStyle/>
+          <a:p>
+            <a:endParaRPr lang="fr-FR"/>
+          </a:p>
+        </p:txBody>
+      </p:sp>
+    </p:spTree>
+    <p:extLst>
+      <p:ext uri="{BB962C8B-B14F-4D97-AF65-F5344CB8AC3E}">
+        <p14:creationId xmlns:p14="http://schemas.microsoft.com/office/powerpoint/2010/main" val="1569922842"/>
+      </p:ext>
+    </p:extLst>
+  </p:cSld>
+  <p:clrMapOvr>
+    <a:masterClrMapping/>
+  </p:clrMapOvr>
+</p:sld>
+</file>
+
+<file path=ppt/slides/slide15.xml><?xml version="1.0" encoding="utf-8"?>
+<p:sld xmlns:a="http://schemas.openxmlformats.org/drawingml/2006/main" xmlns:r="http://schemas.openxmlformats.org/officeDocument/2006/relationships" xmlns:p="http://schemas.openxmlformats.org/presentationml/2006/main">
+  <p:cSld>
+    <p:spTree>
+      <p:nvGrpSpPr>
+        <p:cNvPr id="1" name=""/>
+        <p:cNvGrpSpPr/>
+        <p:nvPr/>
+      </p:nvGrpSpPr>
+      <p:grpSpPr>
+        <a:xfrm>
+          <a:off x="0" y="0"/>
+          <a:ext cx="0" cy="0"/>
+          <a:chOff x="0" y="0"/>
+          <a:chExt cx="0" cy="0"/>
+        </a:xfrm>
+      </p:grpSpPr>
+      <p:sp>
+        <p:nvSpPr>
+          <p:cNvPr id="2" name="Titre 1">
+            <a:extLst>
+              <a:ext uri="{FF2B5EF4-FFF2-40B4-BE49-F238E27FC236}">
+                <a16:creationId xmlns:a16="http://schemas.microsoft.com/office/drawing/2014/main" id="{050B3FE0-2697-4326-8462-10FFDAF52EA7}"/>
+              </a:ext>
+            </a:extLst>
+          </p:cNvPr>
+          <p:cNvSpPr>
+            <a:spLocks noGrp="1"/>
+          </p:cNvSpPr>
+          <p:nvPr>
+            <p:ph type="title"/>
+          </p:nvPr>
+        </p:nvSpPr>
+        <p:spPr/>
+        <p:txBody>
+          <a:bodyPr/>
+          <a:lstStyle/>
+          <a:p>
+            <a:r>
+              <a:rPr lang="fr-FR" dirty="0"/>
+              <a:t>Sélections des données</a:t>
+            </a:r>
+          </a:p>
+        </p:txBody>
+      </p:sp>
+      <p:sp>
+        <p:nvSpPr>
+          <p:cNvPr id="3" name="Espace réservé du contenu 2">
+            <a:extLst>
+              <a:ext uri="{FF2B5EF4-FFF2-40B4-BE49-F238E27FC236}">
+                <a16:creationId xmlns:a16="http://schemas.microsoft.com/office/drawing/2014/main" id="{5C4EF87C-6AEB-4548-87B7-379B6A23AA4B}"/>
+              </a:ext>
+            </a:extLst>
+          </p:cNvPr>
+          <p:cNvSpPr>
+            <a:spLocks noGrp="1"/>
+          </p:cNvSpPr>
+          <p:nvPr>
+            <p:ph idx="1"/>
+          </p:nvPr>
+        </p:nvSpPr>
+        <p:spPr/>
+        <p:txBody>
+          <a:bodyPr/>
+          <a:lstStyle/>
+          <a:p>
+            <a:endParaRPr lang="fr-FR"/>
+          </a:p>
+        </p:txBody>
+      </p:sp>
+    </p:spTree>
+    <p:extLst>
+      <p:ext uri="{BB962C8B-B14F-4D97-AF65-F5344CB8AC3E}">
+        <p14:creationId xmlns:p14="http://schemas.microsoft.com/office/powerpoint/2010/main" val="2084917812"/>
+      </p:ext>
+    </p:extLst>
+  </p:cSld>
+  <p:clrMapOvr>
+    <a:masterClrMapping/>
+  </p:clrMapOvr>
+</p:sld>
+</file>
+
+<file path=ppt/slides/slide16.xml><?xml version="1.0" encoding="utf-8"?>
 <p:sld xmlns:a="http://schemas.openxmlformats.org/drawingml/2006/main" xmlns:r="http://schemas.openxmlformats.org/officeDocument/2006/relationships" xmlns:p="http://schemas.openxmlformats.org/presentationml/2006/main">
   <p:cSld>
     <p:bg>
@@ -21224,7 +22353,90 @@
 </p:sld>
 </file>
 
-<file path=ppt/slides/slide13.xml><?xml version="1.0" encoding="utf-8"?>
+<file path=ppt/slides/slide17.xml><?xml version="1.0" encoding="utf-8"?>
+<p:sld xmlns:a="http://schemas.openxmlformats.org/drawingml/2006/main" xmlns:r="http://schemas.openxmlformats.org/officeDocument/2006/relationships" xmlns:p="http://schemas.openxmlformats.org/presentationml/2006/main">
+  <p:cSld>
+    <p:spTree>
+      <p:nvGrpSpPr>
+        <p:cNvPr id="1" name=""/>
+        <p:cNvGrpSpPr/>
+        <p:nvPr/>
+      </p:nvGrpSpPr>
+      <p:grpSpPr>
+        <a:xfrm>
+          <a:off x="0" y="0"/>
+          <a:ext cx="0" cy="0"/>
+          <a:chOff x="0" y="0"/>
+          <a:chExt cx="0" cy="0"/>
+        </a:xfrm>
+      </p:grpSpPr>
+      <p:sp>
+        <p:nvSpPr>
+          <p:cNvPr id="2" name="Titre 1">
+            <a:extLst>
+              <a:ext uri="{FF2B5EF4-FFF2-40B4-BE49-F238E27FC236}">
+                <a16:creationId xmlns:a16="http://schemas.microsoft.com/office/drawing/2014/main" id="{E1AFE992-8923-424D-8BA3-03BBF5B22395}"/>
+              </a:ext>
+            </a:extLst>
+          </p:cNvPr>
+          <p:cNvSpPr>
+            <a:spLocks noGrp="1"/>
+          </p:cNvSpPr>
+          <p:nvPr>
+            <p:ph type="title"/>
+          </p:nvPr>
+        </p:nvSpPr>
+        <p:spPr/>
+        <p:txBody>
+          <a:bodyPr/>
+          <a:lstStyle/>
+          <a:p>
+            <a:r>
+              <a:rPr lang="fr-FR" dirty="0"/>
+              <a:t>Choix des modèles</a:t>
+            </a:r>
+          </a:p>
+        </p:txBody>
+      </p:sp>
+      <p:sp>
+        <p:nvSpPr>
+          <p:cNvPr id="3" name="Espace réservé du contenu 2">
+            <a:extLst>
+              <a:ext uri="{FF2B5EF4-FFF2-40B4-BE49-F238E27FC236}">
+                <a16:creationId xmlns:a16="http://schemas.microsoft.com/office/drawing/2014/main" id="{99EA8797-B5B8-4072-A8B4-BE8C79B996CB}"/>
+              </a:ext>
+            </a:extLst>
+          </p:cNvPr>
+          <p:cNvSpPr>
+            <a:spLocks noGrp="1"/>
+          </p:cNvSpPr>
+          <p:nvPr>
+            <p:ph idx="1"/>
+          </p:nvPr>
+        </p:nvSpPr>
+        <p:spPr/>
+        <p:txBody>
+          <a:bodyPr/>
+          <a:lstStyle/>
+          <a:p>
+            <a:endParaRPr lang="fr-FR"/>
+          </a:p>
+        </p:txBody>
+      </p:sp>
+    </p:spTree>
+    <p:extLst>
+      <p:ext uri="{BB962C8B-B14F-4D97-AF65-F5344CB8AC3E}">
+        <p14:creationId xmlns:p14="http://schemas.microsoft.com/office/powerpoint/2010/main" val="2958495979"/>
+      </p:ext>
+    </p:extLst>
+  </p:cSld>
+  <p:clrMapOvr>
+    <a:masterClrMapping/>
+  </p:clrMapOvr>
+</p:sld>
+</file>
+
+<file path=ppt/slides/slide18.xml><?xml version="1.0" encoding="utf-8"?>
 <p:sld xmlns:a="http://schemas.openxmlformats.org/drawingml/2006/main" xmlns:r="http://schemas.openxmlformats.org/officeDocument/2006/relationships" xmlns:p="http://schemas.openxmlformats.org/presentationml/2006/main">
   <p:cSld>
     <p:spTree>
@@ -21262,7 +22474,10 @@
           <a:bodyPr/>
           <a:lstStyle/>
           <a:p>
-            <a:endParaRPr lang="fr-FR"/>
+            <a:r>
+              <a:rPr lang="fr-FR" dirty="0"/>
+              <a:t>Test itératifs</a:t>
+            </a:r>
           </a:p>
         </p:txBody>
       </p:sp>
@@ -21340,7 +22555,7 @@
 </p:sld>
 </file>
 
-<file path=ppt/slides/slide14.xml><?xml version="1.0" encoding="utf-8"?>
+<file path=ppt/slides/slide19.xml><?xml version="1.0" encoding="utf-8"?>
 <p:sld xmlns:a="http://schemas.openxmlformats.org/drawingml/2006/main" xmlns:r="http://schemas.openxmlformats.org/officeDocument/2006/relationships" xmlns:p="http://schemas.openxmlformats.org/presentationml/2006/main">
   <p:cSld>
     <p:spTree>
@@ -21378,7 +22593,10 @@
           <a:bodyPr/>
           <a:lstStyle/>
           <a:p>
-            <a:endParaRPr lang="fr-FR"/>
+            <a:r>
+              <a:rPr lang="fr-FR" dirty="0"/>
+              <a:t>Optimisation du modèles</a:t>
+            </a:r>
           </a:p>
         </p:txBody>
       </p:sp>
@@ -21456,7 +22674,439 @@
 </p:sld>
 </file>
 
-<file path=ppt/slides/slide15.xml><?xml version="1.0" encoding="utf-8"?>
+<file path=ppt/slides/slide2.xml><?xml version="1.0" encoding="utf-8"?>
+<p:sld xmlns:a="http://schemas.openxmlformats.org/drawingml/2006/main" xmlns:r="http://schemas.openxmlformats.org/officeDocument/2006/relationships" xmlns:p="http://schemas.openxmlformats.org/presentationml/2006/main">
+  <p:cSld>
+    <p:bg>
+      <p:bgPr>
+        <a:solidFill>
+          <a:schemeClr val="bg1"/>
+        </a:solidFill>
+        <a:effectLst/>
+      </p:bgPr>
+    </p:bg>
+    <p:spTree>
+      <p:nvGrpSpPr>
+        <p:cNvPr id="1" name=""/>
+        <p:cNvGrpSpPr/>
+        <p:nvPr/>
+      </p:nvGrpSpPr>
+      <p:grpSpPr>
+        <a:xfrm>
+          <a:off x="0" y="0"/>
+          <a:ext cx="0" cy="0"/>
+          <a:chOff x="0" y="0"/>
+          <a:chExt cx="0" cy="0"/>
+        </a:xfrm>
+      </p:grpSpPr>
+      <p:sp useBgFill="1">
+        <p:nvSpPr>
+          <p:cNvPr id="9" name="Rectangle 8">
+            <a:extLst>
+              <a:ext uri="{FF2B5EF4-FFF2-40B4-BE49-F238E27FC236}">
+                <a16:creationId xmlns:a16="http://schemas.microsoft.com/office/drawing/2014/main" id="{545D489D-16E1-484D-867B-144368D74B83}"/>
+              </a:ext>
+              <a:ext uri="{C183D7F6-B498-43B3-948B-1728B52AA6E4}">
+                <adec:decorative xmlns:adec="http://schemas.microsoft.com/office/drawing/2017/decorative" val="1"/>
+              </a:ext>
+            </a:extLst>
+          </p:cNvPr>
+          <p:cNvSpPr>
+            <a:spLocks noGrp="1" noRot="1" noChangeAspect="1" noMove="1" noResize="1" noEditPoints="1" noAdjustHandles="1" noChangeArrowheads="1" noChangeShapeType="1" noTextEdit="1"/>
+          </p:cNvSpPr>
+          <p:nvPr>
+            <p:extLst>
+              <p:ext uri="{386F3935-93C4-4BCD-93E2-E3B085C9AB24}">
+                <p16:designElem xmlns:p16="http://schemas.microsoft.com/office/powerpoint/2015/main" val="1"/>
+              </p:ext>
+            </p:extLst>
+          </p:nvPr>
+        </p:nvSpPr>
+        <p:spPr>
+          <a:xfrm>
+            <a:off x="0" y="0"/>
+            <a:ext cx="12188952" cy="6858000"/>
+          </a:xfrm>
+          <a:prstGeom prst="rect">
+            <a:avLst/>
+          </a:prstGeom>
+          <a:ln>
+            <a:noFill/>
+          </a:ln>
+        </p:spPr>
+        <p:style>
+          <a:lnRef idx="2">
+            <a:schemeClr val="accent1">
+              <a:shade val="50000"/>
+            </a:schemeClr>
+          </a:lnRef>
+          <a:fillRef idx="1">
+            <a:schemeClr val="accent1"/>
+          </a:fillRef>
+          <a:effectRef idx="0">
+            <a:schemeClr val="accent1"/>
+          </a:effectRef>
+          <a:fontRef idx="minor">
+            <a:schemeClr val="lt1"/>
+          </a:fontRef>
+        </p:style>
+        <p:txBody>
+          <a:bodyPr rtlCol="0" anchor="ctr"/>
+          <a:lstStyle/>
+          <a:p>
+            <a:pPr marL="0" marR="0" lvl="0" indent="0" algn="ctr" defTabSz="914400" rtl="0" eaLnBrk="1" fontAlgn="auto" latinLnBrk="0" hangingPunct="1">
+              <a:lnSpc>
+                <a:spcPct val="100000"/>
+              </a:lnSpc>
+              <a:spcBef>
+                <a:spcPts val="0"/>
+              </a:spcBef>
+              <a:spcAft>
+                <a:spcPts val="0"/>
+              </a:spcAft>
+              <a:buClrTx/>
+              <a:buSzTx/>
+              <a:buFontTx/>
+              <a:buNone/>
+              <a:tabLst/>
+              <a:defRPr/>
+            </a:pPr>
+            <a:endParaRPr kumimoji="0" lang="en-US" sz="1800" b="0" i="0" u="none" strike="noStrike" kern="1200" cap="none" spc="0" normalizeH="0" baseline="0" noProof="0">
+              <a:ln>
+                <a:noFill/>
+              </a:ln>
+              <a:solidFill>
+                <a:prstClr val="white"/>
+              </a:solidFill>
+              <a:effectLst/>
+              <a:uLnTx/>
+              <a:uFillTx/>
+              <a:latin typeface="Calibri" panose="020F0502020204030204"/>
+              <a:ea typeface="+mn-ea"/>
+              <a:cs typeface="+mn-cs"/>
+            </a:endParaRPr>
+          </a:p>
+        </p:txBody>
+      </p:sp>
+      <p:sp>
+        <p:nvSpPr>
+          <p:cNvPr id="11" name="Rectangle 10">
+            <a:extLst>
+              <a:ext uri="{FF2B5EF4-FFF2-40B4-BE49-F238E27FC236}">
+                <a16:creationId xmlns:a16="http://schemas.microsoft.com/office/drawing/2014/main" id="{49A496F5-B01E-4BF8-9D1E-C4E53B6F9652}"/>
+              </a:ext>
+              <a:ext uri="{C183D7F6-B498-43B3-948B-1728B52AA6E4}">
+                <adec:decorative xmlns:adec="http://schemas.microsoft.com/office/drawing/2017/decorative" val="1"/>
+              </a:ext>
+            </a:extLst>
+          </p:cNvPr>
+          <p:cNvSpPr>
+            <a:spLocks noGrp="1" noRot="1" noChangeAspect="1" noMove="1" noResize="1" noEditPoints="1" noAdjustHandles="1" noChangeArrowheads="1" noChangeShapeType="1" noTextEdit="1"/>
+          </p:cNvSpPr>
+          <p:nvPr>
+            <p:extLst>
+              <p:ext uri="{386F3935-93C4-4BCD-93E2-E3B085C9AB24}">
+                <p16:designElem xmlns:p16="http://schemas.microsoft.com/office/powerpoint/2015/main" val="1"/>
+              </p:ext>
+            </p:extLst>
+          </p:nvPr>
+        </p:nvSpPr>
+        <p:spPr>
+          <a:xfrm>
+            <a:off x="0" y="0"/>
+            <a:ext cx="4522573" cy="6858000"/>
+          </a:xfrm>
+          <a:prstGeom prst="rect">
+            <a:avLst/>
+          </a:prstGeom>
+          <a:solidFill>
+            <a:schemeClr val="accent2"/>
+          </a:solidFill>
+          <a:ln>
+            <a:noFill/>
+          </a:ln>
+        </p:spPr>
+        <p:style>
+          <a:lnRef idx="2">
+            <a:schemeClr val="accent1">
+              <a:shade val="50000"/>
+            </a:schemeClr>
+          </a:lnRef>
+          <a:fillRef idx="1">
+            <a:schemeClr val="accent1"/>
+          </a:fillRef>
+          <a:effectRef idx="0">
+            <a:schemeClr val="accent1"/>
+          </a:effectRef>
+          <a:fontRef idx="minor">
+            <a:schemeClr val="lt1"/>
+          </a:fontRef>
+        </p:style>
+        <p:txBody>
+          <a:bodyPr rtlCol="0" anchor="ctr"/>
+          <a:lstStyle/>
+          <a:p>
+            <a:pPr marL="0" marR="0" lvl="0" indent="0" algn="ctr" defTabSz="914400" rtl="0" eaLnBrk="1" fontAlgn="auto" latinLnBrk="0" hangingPunct="1">
+              <a:lnSpc>
+                <a:spcPct val="100000"/>
+              </a:lnSpc>
+              <a:spcBef>
+                <a:spcPts val="0"/>
+              </a:spcBef>
+              <a:spcAft>
+                <a:spcPts val="0"/>
+              </a:spcAft>
+              <a:buClrTx/>
+              <a:buSzTx/>
+              <a:buFontTx/>
+              <a:buNone/>
+              <a:tabLst/>
+              <a:defRPr/>
+            </a:pPr>
+            <a:endParaRPr kumimoji="0" lang="en-US" sz="1800" b="0" i="0" u="none" strike="noStrike" kern="1200" cap="none" spc="0" normalizeH="0" baseline="0" noProof="0">
+              <a:ln>
+                <a:noFill/>
+              </a:ln>
+              <a:solidFill>
+                <a:prstClr val="white"/>
+              </a:solidFill>
+              <a:effectLst/>
+              <a:uLnTx/>
+              <a:uFillTx/>
+              <a:latin typeface="Calibri" panose="020F0502020204030204"/>
+              <a:ea typeface="+mn-ea"/>
+              <a:cs typeface="+mn-cs"/>
+            </a:endParaRPr>
+          </a:p>
+        </p:txBody>
+      </p:sp>
+      <p:sp>
+        <p:nvSpPr>
+          <p:cNvPr id="13" name="Arc 12">
+            <a:extLst>
+              <a:ext uri="{FF2B5EF4-FFF2-40B4-BE49-F238E27FC236}">
+                <a16:creationId xmlns:a16="http://schemas.microsoft.com/office/drawing/2014/main" id="{6E895C8D-1379-40B8-8B1B-B6F5AEAF0A6C}"/>
+              </a:ext>
+              <a:ext uri="{C183D7F6-B498-43B3-948B-1728B52AA6E4}">
+                <adec:decorative xmlns:adec="http://schemas.microsoft.com/office/drawing/2017/decorative" val="1"/>
+              </a:ext>
+            </a:extLst>
+          </p:cNvPr>
+          <p:cNvSpPr>
+            <a:spLocks noGrp="1" noRot="1" noChangeAspect="1" noMove="1" noResize="1" noEditPoints="1" noAdjustHandles="1" noChangeArrowheads="1" noChangeShapeType="1" noTextEdit="1"/>
+          </p:cNvSpPr>
+          <p:nvPr>
+            <p:extLst>
+              <p:ext uri="{386F3935-93C4-4BCD-93E2-E3B085C9AB24}">
+                <p16:designElem xmlns:p16="http://schemas.microsoft.com/office/powerpoint/2015/main" val="1"/>
+              </p:ext>
+            </p:extLst>
+          </p:nvPr>
+        </p:nvSpPr>
+        <p:spPr>
+          <a:xfrm rot="20746107">
+            <a:off x="2906963" y="1348064"/>
+            <a:ext cx="2987899" cy="2987899"/>
+          </a:xfrm>
+          <a:prstGeom prst="arc">
+            <a:avLst>
+              <a:gd name="adj1" fmla="val 14612914"/>
+              <a:gd name="adj2" fmla="val 0"/>
+            </a:avLst>
+          </a:prstGeom>
+          <a:ln w="127000" cap="rnd">
+            <a:solidFill>
+              <a:schemeClr val="accent2">
+                <a:lumMod val="75000"/>
+              </a:schemeClr>
+            </a:solidFill>
+            <a:prstDash val="dash"/>
+          </a:ln>
+        </p:spPr>
+        <p:style>
+          <a:lnRef idx="1">
+            <a:schemeClr val="accent1"/>
+          </a:lnRef>
+          <a:fillRef idx="0">
+            <a:schemeClr val="accent1"/>
+          </a:fillRef>
+          <a:effectRef idx="0">
+            <a:schemeClr val="accent1"/>
+          </a:effectRef>
+          <a:fontRef idx="minor">
+            <a:schemeClr val="tx1"/>
+          </a:fontRef>
+        </p:style>
+        <p:txBody>
+          <a:bodyPr rtlCol="0" anchor="ctr"/>
+          <a:lstStyle/>
+          <a:p>
+            <a:pPr marL="0" marR="0" lvl="0" indent="0" algn="ctr" defTabSz="914400" rtl="0" eaLnBrk="1" fontAlgn="auto" latinLnBrk="0" hangingPunct="1">
+              <a:lnSpc>
+                <a:spcPct val="100000"/>
+              </a:lnSpc>
+              <a:spcBef>
+                <a:spcPts val="0"/>
+              </a:spcBef>
+              <a:spcAft>
+                <a:spcPts val="0"/>
+              </a:spcAft>
+              <a:buClrTx/>
+              <a:buSzTx/>
+              <a:buFontTx/>
+              <a:buNone/>
+              <a:tabLst/>
+              <a:defRPr/>
+            </a:pPr>
+            <a:endParaRPr kumimoji="0" lang="en-US" sz="1800" b="0" i="0" u="none" strike="noStrike" kern="1200" cap="none" spc="0" normalizeH="0" baseline="0" noProof="0">
+              <a:ln>
+                <a:noFill/>
+              </a:ln>
+              <a:solidFill>
+                <a:srgbClr val="000000"/>
+              </a:solidFill>
+              <a:effectLst/>
+              <a:uLnTx/>
+              <a:uFillTx/>
+              <a:latin typeface="Calibri" panose="020F0502020204030204"/>
+              <a:ea typeface="+mn-ea"/>
+              <a:cs typeface="+mn-cs"/>
+            </a:endParaRPr>
+          </a:p>
+        </p:txBody>
+      </p:sp>
+      <p:sp>
+        <p:nvSpPr>
+          <p:cNvPr id="2" name="Titre 1">
+            <a:extLst>
+              <a:ext uri="{FF2B5EF4-FFF2-40B4-BE49-F238E27FC236}">
+                <a16:creationId xmlns:a16="http://schemas.microsoft.com/office/drawing/2014/main" id="{52921E90-FB47-415C-9774-517315D084DF}"/>
+              </a:ext>
+            </a:extLst>
+          </p:cNvPr>
+          <p:cNvSpPr>
+            <a:spLocks noGrp="1"/>
+          </p:cNvSpPr>
+          <p:nvPr>
+            <p:ph type="title"/>
+          </p:nvPr>
+        </p:nvSpPr>
+        <p:spPr>
+          <a:xfrm>
+            <a:off x="838200" y="643467"/>
+            <a:ext cx="2951205" cy="5571066"/>
+          </a:xfrm>
+        </p:spPr>
+        <p:txBody>
+          <a:bodyPr>
+            <a:normAutofit/>
+          </a:bodyPr>
+          <a:lstStyle/>
+          <a:p>
+            <a:r>
+              <a:rPr lang="fr-FR">
+                <a:solidFill>
+                  <a:srgbClr val="FFFFFF"/>
+                </a:solidFill>
+              </a:rPr>
+              <a:t>Sommaire</a:t>
+            </a:r>
+          </a:p>
+        </p:txBody>
+      </p:sp>
+      <p:graphicFrame>
+        <p:nvGraphicFramePr>
+          <p:cNvPr id="5" name="Espace réservé du contenu 2">
+            <a:extLst>
+              <a:ext uri="{FF2B5EF4-FFF2-40B4-BE49-F238E27FC236}">
+                <a16:creationId xmlns:a16="http://schemas.microsoft.com/office/drawing/2014/main" id="{E176FEDD-B12A-4F4F-BE67-CAE298FA7BDB}"/>
+              </a:ext>
+            </a:extLst>
+          </p:cNvPr>
+          <p:cNvGraphicFramePr>
+            <a:graphicFrameLocks noGrp="1"/>
+          </p:cNvGraphicFramePr>
+          <p:nvPr>
+            <p:ph idx="1"/>
+            <p:extLst>
+              <p:ext uri="{D42A27DB-BD31-4B8C-83A1-F6EECF244321}">
+                <p14:modId xmlns:p14="http://schemas.microsoft.com/office/powerpoint/2010/main" val="1285904286"/>
+              </p:ext>
+            </p:extLst>
+          </p:nvPr>
+        </p:nvGraphicFramePr>
+        <p:xfrm>
+          <a:off x="5237018" y="653693"/>
+          <a:ext cx="6303729" cy="5560839"/>
+        </p:xfrm>
+        <a:graphic>
+          <a:graphicData uri="http://schemas.openxmlformats.org/drawingml/2006/diagram">
+            <dgm:relIds xmlns:dgm="http://schemas.openxmlformats.org/drawingml/2006/diagram" xmlns:r="http://schemas.openxmlformats.org/officeDocument/2006/relationships" r:dm="rId2" r:lo="rId3" r:qs="rId4" r:cs="rId5"/>
+          </a:graphicData>
+        </a:graphic>
+      </p:graphicFrame>
+      <p:pic>
+        <p:nvPicPr>
+          <p:cNvPr id="8" name="Image 7">
+            <a:extLst>
+              <a:ext uri="{FF2B5EF4-FFF2-40B4-BE49-F238E27FC236}">
+                <a16:creationId xmlns:a16="http://schemas.microsoft.com/office/drawing/2014/main" id="{17502D61-96AC-4DFB-8BDB-3019BC18A705}"/>
+              </a:ext>
+            </a:extLst>
+          </p:cNvPr>
+          <p:cNvPicPr>
+            <a:picLocks noChangeAspect="1"/>
+          </p:cNvPicPr>
+          <p:nvPr/>
+        </p:nvPicPr>
+        <p:blipFill>
+          <a:blip r:embed="rId7">
+            <a:extLst>
+              <a:ext uri="{28A0092B-C50C-407E-A947-70E740481C1C}">
+                <a14:useLocalDpi xmlns:a14="http://schemas.microsoft.com/office/drawing/2010/main" val="0"/>
+              </a:ext>
+            </a:extLst>
+          </a:blip>
+          <a:stretch>
+            <a:fillRect/>
+          </a:stretch>
+        </p:blipFill>
+        <p:spPr>
+          <a:xfrm>
+            <a:off x="11476815" y="6204306"/>
+            <a:ext cx="712136" cy="653693"/>
+          </a:xfrm>
+          <a:prstGeom prst="rect">
+            <a:avLst/>
+          </a:prstGeom>
+        </p:spPr>
+      </p:pic>
+    </p:spTree>
+    <p:extLst>
+      <p:ext uri="{BB962C8B-B14F-4D97-AF65-F5344CB8AC3E}">
+        <p14:creationId xmlns:p14="http://schemas.microsoft.com/office/powerpoint/2010/main" val="3773679173"/>
+      </p:ext>
+    </p:extLst>
+  </p:cSld>
+  <p:clrMapOvr>
+    <a:masterClrMapping/>
+  </p:clrMapOvr>
+  <mc:AlternateContent xmlns:mc="http://schemas.openxmlformats.org/markup-compatibility/2006" xmlns:p159="http://schemas.microsoft.com/office/powerpoint/2015/09/main">
+    <mc:Choice Requires="p159">
+      <p:transition xmlns:p14="http://schemas.microsoft.com/office/powerpoint/2010/main" spd="slow" p14:dur="1500">
+        <p159:morph option="byObject"/>
+      </p:transition>
+    </mc:Choice>
+    <mc:Fallback xmlns="">
+      <p:transition spd="slow">
+        <p:fade/>
+      </p:transition>
+    </mc:Fallback>
+  </mc:AlternateContent>
+</p:sld>
+</file>
+
+<file path=ppt/slides/slide20.xml><?xml version="1.0" encoding="utf-8"?>
 <p:sld xmlns:a="http://schemas.openxmlformats.org/drawingml/2006/main" xmlns:r="http://schemas.openxmlformats.org/officeDocument/2006/relationships" xmlns:p="http://schemas.openxmlformats.org/presentationml/2006/main">
   <p:cSld>
     <p:bg>
@@ -22276,7 +23926,114 @@
 </p:sld>
 </file>
 
-<file path=ppt/slides/slide16.xml><?xml version="1.0" encoding="utf-8"?>
+<file path=ppt/slides/slide21.xml><?xml version="1.0" encoding="utf-8"?>
+<p:sld xmlns:a="http://schemas.openxmlformats.org/drawingml/2006/main" xmlns:r="http://schemas.openxmlformats.org/officeDocument/2006/relationships" xmlns:p="http://schemas.openxmlformats.org/presentationml/2006/main">
+  <p:cSld>
+    <p:spTree>
+      <p:nvGrpSpPr>
+        <p:cNvPr id="1" name=""/>
+        <p:cNvGrpSpPr/>
+        <p:nvPr/>
+      </p:nvGrpSpPr>
+      <p:grpSpPr>
+        <a:xfrm>
+          <a:off x="0" y="0"/>
+          <a:ext cx="0" cy="0"/>
+          <a:chOff x="0" y="0"/>
+          <a:chExt cx="0" cy="0"/>
+        </a:xfrm>
+      </p:grpSpPr>
+      <p:sp>
+        <p:nvSpPr>
+          <p:cNvPr id="2" name="Titre 1">
+            <a:extLst>
+              <a:ext uri="{FF2B5EF4-FFF2-40B4-BE49-F238E27FC236}">
+                <a16:creationId xmlns:a16="http://schemas.microsoft.com/office/drawing/2014/main" id="{3D80D71A-81D3-4C3F-9502-FD2054AD9105}"/>
+              </a:ext>
+            </a:extLst>
+          </p:cNvPr>
+          <p:cNvSpPr>
+            <a:spLocks noGrp="1"/>
+          </p:cNvSpPr>
+          <p:nvPr>
+            <p:ph type="title"/>
+          </p:nvPr>
+        </p:nvSpPr>
+        <p:spPr/>
+        <p:txBody>
+          <a:bodyPr/>
+          <a:lstStyle/>
+          <a:p>
+            <a:r>
+              <a:rPr lang="fr-FR" dirty="0"/>
+              <a:t>Explication simple</a:t>
+            </a:r>
+          </a:p>
+        </p:txBody>
+      </p:sp>
+      <p:pic>
+        <p:nvPicPr>
+          <p:cNvPr id="1026" name="Picture 2">
+            <a:extLst>
+              <a:ext uri="{FF2B5EF4-FFF2-40B4-BE49-F238E27FC236}">
+                <a16:creationId xmlns:a16="http://schemas.microsoft.com/office/drawing/2014/main" id="{977EE6DA-B0F0-4038-8EB5-BFC7F475453F}"/>
+              </a:ext>
+            </a:extLst>
+          </p:cNvPr>
+          <p:cNvPicPr>
+            <a:picLocks noGrp="1" noChangeAspect="1" noChangeArrowheads="1"/>
+          </p:cNvPicPr>
+          <p:nvPr>
+            <p:ph idx="1"/>
+          </p:nvPr>
+        </p:nvPicPr>
+        <p:blipFill>
+          <a:blip r:embed="rId2">
+            <a:extLst>
+              <a:ext uri="{28A0092B-C50C-407E-A947-70E740481C1C}">
+                <a14:useLocalDpi xmlns:a14="http://schemas.microsoft.com/office/drawing/2010/main" val="0"/>
+              </a:ext>
+            </a:extLst>
+          </a:blip>
+          <a:srcRect/>
+          <a:stretch>
+            <a:fillRect/>
+          </a:stretch>
+        </p:blipFill>
+        <p:spPr bwMode="auto">
+          <a:xfrm>
+            <a:off x="2380743" y="1803854"/>
+            <a:ext cx="8100023" cy="4784505"/>
+          </a:xfrm>
+          <a:prstGeom prst="rect">
+            <a:avLst/>
+          </a:prstGeom>
+          <a:noFill/>
+          <a:extLst>
+            <a:ext uri="{909E8E84-426E-40DD-AFC4-6F175D3DCCD1}">
+              <a14:hiddenFill xmlns:a14="http://schemas.microsoft.com/office/drawing/2010/main">
+                <a:solidFill>
+                  <a:srgbClr val="FFFFFF"/>
+                </a:solidFill>
+              </a14:hiddenFill>
+            </a:ext>
+          </a:extLst>
+        </p:spPr>
+      </p:pic>
+    </p:spTree>
+    <p:extLst>
+      <p:ext uri="{BB962C8B-B14F-4D97-AF65-F5344CB8AC3E}">
+        <p14:creationId xmlns:p14="http://schemas.microsoft.com/office/powerpoint/2010/main" val="1226315112"/>
+      </p:ext>
+    </p:extLst>
+  </p:cSld>
+  <p:clrMapOvr>
+    <a:masterClrMapping/>
+  </p:clrMapOvr>
+</p:sld>
+</file>
+
+<file path=ppt/slides/slide22.xml><?xml version="1.0" encoding="utf-8"?>
 <p:sld xmlns:a="http://schemas.openxmlformats.org/drawingml/2006/main" xmlns:r="http://schemas.openxmlformats.org/officeDocument/2006/relationships" xmlns:p="http://schemas.openxmlformats.org/presentationml/2006/main">
   <p:cSld>
     <p:spTree>
@@ -22314,35 +24071,47 @@
           <a:bodyPr/>
           <a:lstStyle/>
           <a:p>
-            <a:endParaRPr lang="fr-FR"/>
+            <a:r>
+              <a:rPr lang="fr-FR" dirty="0"/>
+              <a:t>LIME</a:t>
+            </a:r>
           </a:p>
         </p:txBody>
       </p:sp>
-      <p:sp>
-        <p:nvSpPr>
-          <p:cNvPr id="3" name="Espace réservé du contenu 2">
+      <p:pic>
+        <p:nvPicPr>
+          <p:cNvPr id="6" name="Espace réservé du contenu 5">
             <a:extLst>
               <a:ext uri="{FF2B5EF4-FFF2-40B4-BE49-F238E27FC236}">
-                <a16:creationId xmlns:a16="http://schemas.microsoft.com/office/drawing/2014/main" id="{9B0E68E0-8B61-4AA8-B439-A5DDEFB43F53}"/>
+                <a16:creationId xmlns:a16="http://schemas.microsoft.com/office/drawing/2014/main" id="{585C7B6E-8FC9-4F99-8198-1ED5D1465170}"/>
               </a:ext>
             </a:extLst>
           </p:cNvPr>
-          <p:cNvSpPr>
-            <a:spLocks noGrp="1"/>
-          </p:cNvSpPr>
+          <p:cNvPicPr>
+            <a:picLocks noGrp="1" noChangeAspect="1"/>
+          </p:cNvPicPr>
           <p:nvPr>
             <p:ph idx="1"/>
           </p:nvPr>
-        </p:nvSpPr>
-        <p:spPr/>
-        <p:txBody>
-          <a:bodyPr/>
-          <a:lstStyle/>
-          <a:p>
-            <a:endParaRPr lang="fr-FR"/>
-          </a:p>
-        </p:txBody>
-      </p:sp>
+        </p:nvPicPr>
+        <p:blipFill rotWithShape="1">
+          <a:blip r:embed="rId2">
+            <a:extLst>
+              <a:ext uri="{28A0092B-C50C-407E-A947-70E740481C1C}">
+                <a14:useLocalDpi xmlns:a14="http://schemas.microsoft.com/office/drawing/2010/main" val="0"/>
+              </a:ext>
+            </a:extLst>
+          </a:blip>
+          <a:srcRect l="27077" r="1988"/>
+          <a:stretch/>
+        </p:blipFill>
+        <p:spPr>
+          <a:xfrm>
+            <a:off x="88347" y="2623902"/>
+            <a:ext cx="6007653" cy="2724734"/>
+          </a:xfrm>
+        </p:spPr>
+      </p:pic>
       <p:pic>
         <p:nvPicPr>
           <p:cNvPr id="4" name="Image 3">
@@ -22358,7 +24127,7 @@
           <p:nvPr/>
         </p:nvPicPr>
         <p:blipFill>
-          <a:blip r:embed="rId2">
+          <a:blip r:embed="rId3">
             <a:extLst>
               <a:ext uri="{28A0092B-C50C-407E-A947-70E740481C1C}">
                 <a14:useLocalDpi xmlns:a14="http://schemas.microsoft.com/office/drawing/2010/main" val="0"/>
@@ -22379,6 +24148,136 @@
           </a:prstGeom>
         </p:spPr>
       </p:pic>
+      <p:pic>
+        <p:nvPicPr>
+          <p:cNvPr id="8" name="Image 7">
+            <a:extLst>
+              <a:ext uri="{FF2B5EF4-FFF2-40B4-BE49-F238E27FC236}">
+                <a16:creationId xmlns:a16="http://schemas.microsoft.com/office/drawing/2014/main" id="{C752CB9E-801C-487C-B497-3662A4898F86}"/>
+              </a:ext>
+            </a:extLst>
+          </p:cNvPr>
+          <p:cNvPicPr>
+            <a:picLocks noChangeAspect="1"/>
+          </p:cNvPicPr>
+          <p:nvPr/>
+        </p:nvPicPr>
+        <p:blipFill rotWithShape="1">
+          <a:blip r:embed="rId4"/>
+          <a:srcRect l="27861" r="2195"/>
+          <a:stretch/>
+        </p:blipFill>
+        <p:spPr>
+          <a:xfrm>
+            <a:off x="6228521" y="2623902"/>
+            <a:ext cx="5641009" cy="2668338"/>
+          </a:xfrm>
+          <a:prstGeom prst="rect">
+            <a:avLst/>
+          </a:prstGeom>
+        </p:spPr>
+      </p:pic>
+      <p:pic>
+        <p:nvPicPr>
+          <p:cNvPr id="9" name="Image 8">
+            <a:extLst>
+              <a:ext uri="{FF2B5EF4-FFF2-40B4-BE49-F238E27FC236}">
+                <a16:creationId xmlns:a16="http://schemas.microsoft.com/office/drawing/2014/main" id="{57E1EA54-A032-41DD-BF21-F1BC8FF753BA}"/>
+              </a:ext>
+            </a:extLst>
+          </p:cNvPr>
+          <p:cNvPicPr>
+            <a:picLocks noChangeAspect="1"/>
+          </p:cNvPicPr>
+          <p:nvPr/>
+        </p:nvPicPr>
+        <p:blipFill rotWithShape="1">
+          <a:blip r:embed="rId4"/>
+          <a:srcRect l="9101" t="9117" r="78425" b="71808"/>
+          <a:stretch/>
+        </p:blipFill>
+        <p:spPr>
+          <a:xfrm>
+            <a:off x="8688344" y="1847370"/>
+            <a:ext cx="1056421" cy="534505"/>
+          </a:xfrm>
+          <a:prstGeom prst="rect">
+            <a:avLst/>
+          </a:prstGeom>
+        </p:spPr>
+      </p:pic>
+      <p:pic>
+        <p:nvPicPr>
+          <p:cNvPr id="10" name="Espace réservé du contenu 5">
+            <a:extLst>
+              <a:ext uri="{FF2B5EF4-FFF2-40B4-BE49-F238E27FC236}">
+                <a16:creationId xmlns:a16="http://schemas.microsoft.com/office/drawing/2014/main" id="{C27858D9-C2AE-4B7F-A394-7AAF343B54B5}"/>
+              </a:ext>
+            </a:extLst>
+          </p:cNvPr>
+          <p:cNvPicPr>
+            <a:picLocks noChangeAspect="1"/>
+          </p:cNvPicPr>
+          <p:nvPr/>
+        </p:nvPicPr>
+        <p:blipFill rotWithShape="1">
+          <a:blip r:embed="rId2">
+            <a:extLst>
+              <a:ext uri="{28A0092B-C50C-407E-A947-70E740481C1C}">
+                <a14:useLocalDpi xmlns:a14="http://schemas.microsoft.com/office/drawing/2010/main" val="0"/>
+              </a:ext>
+            </a:extLst>
+          </a:blip>
+          <a:srcRect l="9023" t="8589" r="77624" b="73091"/>
+          <a:stretch/>
+        </p:blipFill>
+        <p:spPr>
+          <a:xfrm>
+            <a:off x="2938231" y="1907712"/>
+            <a:ext cx="1130852" cy="499166"/>
+          </a:xfrm>
+          <a:prstGeom prst="rect">
+            <a:avLst/>
+          </a:prstGeom>
+        </p:spPr>
+      </p:pic>
+      <p:cxnSp>
+        <p:nvCxnSpPr>
+          <p:cNvPr id="12" name="Connecteur droit 11">
+            <a:extLst>
+              <a:ext uri="{FF2B5EF4-FFF2-40B4-BE49-F238E27FC236}">
+                <a16:creationId xmlns:a16="http://schemas.microsoft.com/office/drawing/2014/main" id="{447629DD-9BEF-4B7D-954D-28F430B45296}"/>
+              </a:ext>
+            </a:extLst>
+          </p:cNvPr>
+          <p:cNvCxnSpPr/>
+          <p:nvPr/>
+        </p:nvCxnSpPr>
+        <p:spPr>
+          <a:xfrm>
+            <a:off x="6170253" y="1574888"/>
+            <a:ext cx="0" cy="4766365"/>
+          </a:xfrm>
+          <a:prstGeom prst="line">
+            <a:avLst/>
+          </a:prstGeom>
+          <a:ln w="38100"/>
+        </p:spPr>
+        <p:style>
+          <a:lnRef idx="1">
+            <a:schemeClr val="accent1"/>
+          </a:lnRef>
+          <a:fillRef idx="0">
+            <a:schemeClr val="accent1"/>
+          </a:fillRef>
+          <a:effectRef idx="0">
+            <a:schemeClr val="accent1"/>
+          </a:effectRef>
+          <a:fontRef idx="minor">
+            <a:schemeClr val="tx1"/>
+          </a:fontRef>
+        </p:style>
+      </p:cxnSp>
     </p:spTree>
     <p:extLst>
       <p:ext uri="{BB962C8B-B14F-4D97-AF65-F5344CB8AC3E}">
@@ -22392,7 +24291,7 @@
 </p:sld>
 </file>
 
-<file path=ppt/slides/slide17.xml><?xml version="1.0" encoding="utf-8"?>
+<file path=ppt/slides/slide23.xml><?xml version="1.0" encoding="utf-8"?>
 <p:sld xmlns:a="http://schemas.openxmlformats.org/drawingml/2006/main" xmlns:r="http://schemas.openxmlformats.org/officeDocument/2006/relationships" xmlns:p="http://schemas.openxmlformats.org/presentationml/2006/main">
   <p:cSld>
     <p:spTree>
@@ -22430,35 +24329,48 @@
           <a:bodyPr/>
           <a:lstStyle/>
           <a:p>
-            <a:endParaRPr lang="fr-FR"/>
+            <a:r>
+              <a:rPr lang="fr-FR" dirty="0"/>
+              <a:t>SHAP</a:t>
+            </a:r>
           </a:p>
         </p:txBody>
       </p:sp>
-      <p:sp>
-        <p:nvSpPr>
-          <p:cNvPr id="3" name="Espace réservé du contenu 2">
+      <p:pic>
+        <p:nvPicPr>
+          <p:cNvPr id="6" name="Espace réservé du contenu 5">
             <a:extLst>
               <a:ext uri="{FF2B5EF4-FFF2-40B4-BE49-F238E27FC236}">
-                <a16:creationId xmlns:a16="http://schemas.microsoft.com/office/drawing/2014/main" id="{9D51D43D-720B-47F7-AA28-18FA3F123627}"/>
+                <a16:creationId xmlns:a16="http://schemas.microsoft.com/office/drawing/2014/main" id="{B7F26435-AF94-4DF8-813E-418680DD93AF}"/>
               </a:ext>
             </a:extLst>
           </p:cNvPr>
-          <p:cNvSpPr>
-            <a:spLocks noGrp="1"/>
-          </p:cNvSpPr>
+          <p:cNvPicPr>
+            <a:picLocks noGrp="1" noChangeAspect="1"/>
+          </p:cNvPicPr>
           <p:nvPr>
             <p:ph idx="1"/>
           </p:nvPr>
-        </p:nvSpPr>
-        <p:spPr/>
-        <p:txBody>
-          <a:bodyPr/>
-          <a:lstStyle/>
-          <a:p>
-            <a:endParaRPr lang="fr-FR"/>
-          </a:p>
-        </p:txBody>
-      </p:sp>
+        </p:nvPicPr>
+        <p:blipFill>
+          <a:blip r:embed="rId2">
+            <a:extLst>
+              <a:ext uri="{28A0092B-C50C-407E-A947-70E740481C1C}">
+                <a14:useLocalDpi xmlns:a14="http://schemas.microsoft.com/office/drawing/2010/main" val="0"/>
+              </a:ext>
+            </a:extLst>
+          </a:blip>
+          <a:stretch>
+            <a:fillRect/>
+          </a:stretch>
+        </p:blipFill>
+        <p:spPr>
+          <a:xfrm>
+            <a:off x="313537" y="2132798"/>
+            <a:ext cx="3078889" cy="2229541"/>
+          </a:xfrm>
+        </p:spPr>
+      </p:pic>
       <p:pic>
         <p:nvPicPr>
           <p:cNvPr id="4" name="Image 3">
@@ -22474,7 +24386,7 @@
           <p:nvPr/>
         </p:nvPicPr>
         <p:blipFill>
-          <a:blip r:embed="rId2">
+          <a:blip r:embed="rId3">
             <a:extLst>
               <a:ext uri="{28A0092B-C50C-407E-A947-70E740481C1C}">
                 <a14:useLocalDpi xmlns:a14="http://schemas.microsoft.com/office/drawing/2010/main" val="0"/>
@@ -22489,6 +24401,300 @@
           <a:xfrm>
             <a:off x="11476815" y="6204306"/>
             <a:ext cx="712136" cy="653693"/>
+          </a:xfrm>
+          <a:prstGeom prst="rect">
+            <a:avLst/>
+          </a:prstGeom>
+        </p:spPr>
+      </p:pic>
+      <p:pic>
+        <p:nvPicPr>
+          <p:cNvPr id="2050" name="Picture 2">
+            <a:extLst>
+              <a:ext uri="{FF2B5EF4-FFF2-40B4-BE49-F238E27FC236}">
+                <a16:creationId xmlns:a16="http://schemas.microsoft.com/office/drawing/2014/main" id="{F95D46EF-D306-4852-AEC6-84D68FEB8ED7}"/>
+              </a:ext>
+            </a:extLst>
+          </p:cNvPr>
+          <p:cNvPicPr>
+            <a:picLocks noChangeAspect="1" noChangeArrowheads="1"/>
+          </p:cNvPicPr>
+          <p:nvPr/>
+        </p:nvPicPr>
+        <p:blipFill>
+          <a:blip r:embed="rId4">
+            <a:extLst>
+              <a:ext uri="{28A0092B-C50C-407E-A947-70E740481C1C}">
+                <a14:useLocalDpi xmlns:a14="http://schemas.microsoft.com/office/drawing/2010/main" val="0"/>
+              </a:ext>
+            </a:extLst>
+          </a:blip>
+          <a:srcRect/>
+          <a:stretch>
+            <a:fillRect/>
+          </a:stretch>
+        </p:blipFill>
+        <p:spPr bwMode="auto">
+          <a:xfrm>
+            <a:off x="7364294" y="2017127"/>
+            <a:ext cx="4169510" cy="2823745"/>
+          </a:xfrm>
+          <a:prstGeom prst="rect">
+            <a:avLst/>
+          </a:prstGeom>
+          <a:noFill/>
+          <a:extLst>
+            <a:ext uri="{909E8E84-426E-40DD-AFC4-6F175D3DCCD1}">
+              <a14:hiddenFill xmlns:a14="http://schemas.microsoft.com/office/drawing/2010/main">
+                <a:solidFill>
+                  <a:srgbClr val="FFFFFF"/>
+                </a:solidFill>
+              </a14:hiddenFill>
+            </a:ext>
+          </a:extLst>
+        </p:spPr>
+      </p:pic>
+      <p:pic>
+        <p:nvPicPr>
+          <p:cNvPr id="2052" name="Picture 4">
+            <a:extLst>
+              <a:ext uri="{FF2B5EF4-FFF2-40B4-BE49-F238E27FC236}">
+                <a16:creationId xmlns:a16="http://schemas.microsoft.com/office/drawing/2014/main" id="{54BC4D29-869F-4109-BF39-9741D8A65216}"/>
+              </a:ext>
+            </a:extLst>
+          </p:cNvPr>
+          <p:cNvPicPr>
+            <a:picLocks noChangeAspect="1" noChangeArrowheads="1"/>
+          </p:cNvPicPr>
+          <p:nvPr/>
+        </p:nvPicPr>
+        <p:blipFill>
+          <a:blip r:embed="rId5">
+            <a:extLst>
+              <a:ext uri="{28A0092B-C50C-407E-A947-70E740481C1C}">
+                <a14:useLocalDpi xmlns:a14="http://schemas.microsoft.com/office/drawing/2010/main" val="0"/>
+              </a:ext>
+            </a:extLst>
+          </a:blip>
+          <a:srcRect/>
+          <a:stretch>
+            <a:fillRect/>
+          </a:stretch>
+        </p:blipFill>
+        <p:spPr bwMode="auto">
+          <a:xfrm>
+            <a:off x="3889442" y="2594667"/>
+            <a:ext cx="2836202" cy="2076174"/>
+          </a:xfrm>
+          <a:prstGeom prst="rect">
+            <a:avLst/>
+          </a:prstGeom>
+          <a:noFill/>
+          <a:extLst>
+            <a:ext uri="{909E8E84-426E-40DD-AFC4-6F175D3DCCD1}">
+              <a14:hiddenFill xmlns:a14="http://schemas.microsoft.com/office/drawing/2010/main">
+                <a:solidFill>
+                  <a:srgbClr val="FFFFFF"/>
+                </a:solidFill>
+              </a14:hiddenFill>
+            </a:ext>
+          </a:extLst>
+        </p:spPr>
+      </p:pic>
+      <p:pic>
+        <p:nvPicPr>
+          <p:cNvPr id="2054" name="Picture 6">
+            <a:extLst>
+              <a:ext uri="{FF2B5EF4-FFF2-40B4-BE49-F238E27FC236}">
+                <a16:creationId xmlns:a16="http://schemas.microsoft.com/office/drawing/2014/main" id="{8F188669-18D2-407C-8209-FD21D51BAE93}"/>
+              </a:ext>
+            </a:extLst>
+          </p:cNvPr>
+          <p:cNvPicPr>
+            <a:picLocks noChangeAspect="1" noChangeArrowheads="1"/>
+          </p:cNvPicPr>
+          <p:nvPr/>
+        </p:nvPicPr>
+        <p:blipFill>
+          <a:blip r:embed="rId6">
+            <a:extLst>
+              <a:ext uri="{28A0092B-C50C-407E-A947-70E740481C1C}">
+                <a14:useLocalDpi xmlns:a14="http://schemas.microsoft.com/office/drawing/2010/main" val="0"/>
+              </a:ext>
+            </a:extLst>
+          </a:blip>
+          <a:srcRect/>
+          <a:stretch>
+            <a:fillRect/>
+          </a:stretch>
+        </p:blipFill>
+        <p:spPr bwMode="auto">
+          <a:xfrm>
+            <a:off x="1921001" y="4840288"/>
+            <a:ext cx="2571486" cy="1878303"/>
+          </a:xfrm>
+          <a:prstGeom prst="rect">
+            <a:avLst/>
+          </a:prstGeom>
+          <a:noFill/>
+          <a:extLst>
+            <a:ext uri="{909E8E84-426E-40DD-AFC4-6F175D3DCCD1}">
+              <a14:hiddenFill xmlns:a14="http://schemas.microsoft.com/office/drawing/2010/main">
+                <a:solidFill>
+                  <a:srgbClr val="FFFFFF"/>
+                </a:solidFill>
+              </a14:hiddenFill>
+            </a:ext>
+          </a:extLst>
+        </p:spPr>
+      </p:pic>
+      <p:pic>
+        <p:nvPicPr>
+          <p:cNvPr id="2056" name="Picture 8">
+            <a:extLst>
+              <a:ext uri="{FF2B5EF4-FFF2-40B4-BE49-F238E27FC236}">
+                <a16:creationId xmlns:a16="http://schemas.microsoft.com/office/drawing/2014/main" id="{A94F259C-2777-4861-8A7A-F0D9A3C6037E}"/>
+              </a:ext>
+            </a:extLst>
+          </p:cNvPr>
+          <p:cNvPicPr>
+            <a:picLocks noChangeAspect="1" noChangeArrowheads="1"/>
+          </p:cNvPicPr>
+          <p:nvPr/>
+        </p:nvPicPr>
+        <p:blipFill>
+          <a:blip r:embed="rId7">
+            <a:extLst>
+              <a:ext uri="{28A0092B-C50C-407E-A947-70E740481C1C}">
+                <a14:useLocalDpi xmlns:a14="http://schemas.microsoft.com/office/drawing/2010/main" val="0"/>
+              </a:ext>
+            </a:extLst>
+          </a:blip>
+          <a:srcRect/>
+          <a:stretch>
+            <a:fillRect/>
+          </a:stretch>
+        </p:blipFill>
+        <p:spPr bwMode="auto">
+          <a:xfrm>
+            <a:off x="5046625" y="4980279"/>
+            <a:ext cx="2374658" cy="1738312"/>
+          </a:xfrm>
+          <a:prstGeom prst="rect">
+            <a:avLst/>
+          </a:prstGeom>
+          <a:noFill/>
+          <a:extLst>
+            <a:ext uri="{909E8E84-426E-40DD-AFC4-6F175D3DCCD1}">
+              <a14:hiddenFill xmlns:a14="http://schemas.microsoft.com/office/drawing/2010/main">
+                <a:solidFill>
+                  <a:srgbClr val="FFFFFF"/>
+                </a:solidFill>
+              </a14:hiddenFill>
+            </a:ext>
+          </a:extLst>
+        </p:spPr>
+      </p:pic>
+      <p:pic>
+        <p:nvPicPr>
+          <p:cNvPr id="2058" name="Picture 10">
+            <a:extLst>
+              <a:ext uri="{FF2B5EF4-FFF2-40B4-BE49-F238E27FC236}">
+                <a16:creationId xmlns:a16="http://schemas.microsoft.com/office/drawing/2014/main" id="{66E067D9-C771-427A-B95E-FFD2C9D86BA8}"/>
+              </a:ext>
+            </a:extLst>
+          </p:cNvPr>
+          <p:cNvPicPr>
+            <a:picLocks noChangeAspect="1" noChangeArrowheads="1"/>
+          </p:cNvPicPr>
+          <p:nvPr/>
+        </p:nvPicPr>
+        <p:blipFill>
+          <a:blip r:embed="rId8">
+            <a:extLst>
+              <a:ext uri="{28A0092B-C50C-407E-A947-70E740481C1C}">
+                <a14:useLocalDpi xmlns:a14="http://schemas.microsoft.com/office/drawing/2010/main" val="0"/>
+              </a:ext>
+            </a:extLst>
+          </a:blip>
+          <a:srcRect/>
+          <a:stretch>
+            <a:fillRect/>
+          </a:stretch>
+        </p:blipFill>
+        <p:spPr bwMode="auto">
+          <a:xfrm>
+            <a:off x="4051371" y="139409"/>
+            <a:ext cx="3045714" cy="2229542"/>
+          </a:xfrm>
+          <a:prstGeom prst="rect">
+            <a:avLst/>
+          </a:prstGeom>
+          <a:noFill/>
+          <a:extLst>
+            <a:ext uri="{909E8E84-426E-40DD-AFC4-6F175D3DCCD1}">
+              <a14:hiddenFill xmlns:a14="http://schemas.microsoft.com/office/drawing/2010/main">
+                <a:solidFill>
+                  <a:srgbClr val="FFFFFF"/>
+                </a:solidFill>
+              </a14:hiddenFill>
+            </a:ext>
+          </a:extLst>
+        </p:spPr>
+      </p:pic>
+      <p:pic>
+        <p:nvPicPr>
+          <p:cNvPr id="8" name="Image 7">
+            <a:extLst>
+              <a:ext uri="{FF2B5EF4-FFF2-40B4-BE49-F238E27FC236}">
+                <a16:creationId xmlns:a16="http://schemas.microsoft.com/office/drawing/2014/main" id="{70504395-A2B5-4013-A2F5-0795B05B1543}"/>
+              </a:ext>
+            </a:extLst>
+          </p:cNvPr>
+          <p:cNvPicPr>
+            <a:picLocks noChangeAspect="1"/>
+          </p:cNvPicPr>
+          <p:nvPr/>
+        </p:nvPicPr>
+        <p:blipFill rotWithShape="1">
+          <a:blip r:embed="rId9"/>
+          <a:srcRect l="4018" t="7580"/>
+          <a:stretch/>
+        </p:blipFill>
+        <p:spPr>
+          <a:xfrm>
+            <a:off x="1653989" y="2090822"/>
+            <a:ext cx="9417568" cy="3309606"/>
+          </a:xfrm>
+          <a:prstGeom prst="rect">
+            <a:avLst/>
+          </a:prstGeom>
+        </p:spPr>
+      </p:pic>
+      <p:pic>
+        <p:nvPicPr>
+          <p:cNvPr id="10" name="Image 9">
+            <a:extLst>
+              <a:ext uri="{FF2B5EF4-FFF2-40B4-BE49-F238E27FC236}">
+                <a16:creationId xmlns:a16="http://schemas.microsoft.com/office/drawing/2014/main" id="{155BE6C5-70D2-422F-BD2F-27994D0ABC0C}"/>
+              </a:ext>
+            </a:extLst>
+          </p:cNvPr>
+          <p:cNvPicPr>
+            <a:picLocks noChangeAspect="1"/>
+          </p:cNvPicPr>
+          <p:nvPr/>
+        </p:nvPicPr>
+        <p:blipFill>
+          <a:blip r:embed="rId10"/>
+          <a:stretch>
+            <a:fillRect/>
+          </a:stretch>
+        </p:blipFill>
+        <p:spPr>
+          <a:xfrm>
+            <a:off x="1458509" y="3422422"/>
+            <a:ext cx="6101265" cy="2158647"/>
           </a:xfrm>
           <a:prstGeom prst="rect">
             <a:avLst/>
@@ -22508,7 +24714,7 @@
 </p:sld>
 </file>
 
-<file path=ppt/slides/slide18.xml><?xml version="1.0" encoding="utf-8"?>
+<file path=ppt/slides/slide24.xml><?xml version="1.0" encoding="utf-8"?>
 <p:sld xmlns:a="http://schemas.openxmlformats.org/drawingml/2006/main" xmlns:r="http://schemas.openxmlformats.org/officeDocument/2006/relationships" xmlns:p="http://schemas.openxmlformats.org/presentationml/2006/main">
   <p:cSld>
     <p:bg>
@@ -23401,7 +25607,7 @@
 </p:sld>
 </file>
 
-<file path=ppt/slides/slide19.xml><?xml version="1.0" encoding="utf-8"?>
+<file path=ppt/slides/slide25.xml><?xml version="1.0" encoding="utf-8"?>
 <p:sld xmlns:a="http://schemas.openxmlformats.org/drawingml/2006/main" xmlns:r="http://schemas.openxmlformats.org/officeDocument/2006/relationships" xmlns:p="http://schemas.openxmlformats.org/presentationml/2006/main">
   <p:cSld>
     <p:spTree>
@@ -23439,35 +25645,48 @@
           <a:bodyPr/>
           <a:lstStyle/>
           <a:p>
-            <a:endParaRPr lang="fr-FR"/>
+            <a:r>
+              <a:rPr lang="fr-FR" dirty="0"/>
+              <a:t>Conclusion</a:t>
+            </a:r>
           </a:p>
         </p:txBody>
       </p:sp>
-      <p:sp>
-        <p:nvSpPr>
-          <p:cNvPr id="3" name="Espace réservé du contenu 2">
+      <p:pic>
+        <p:nvPicPr>
+          <p:cNvPr id="6" name="Espace réservé du contenu 5" descr="Une image contenant table&#10;&#10;Description générée automatiquement">
             <a:extLst>
               <a:ext uri="{FF2B5EF4-FFF2-40B4-BE49-F238E27FC236}">
-                <a16:creationId xmlns:a16="http://schemas.microsoft.com/office/drawing/2014/main" id="{1F6050C9-A75B-4299-8387-6AC6FA79D7D5}"/>
+                <a16:creationId xmlns:a16="http://schemas.microsoft.com/office/drawing/2014/main" id="{BB8C3436-389D-4E46-8FA6-5A12AF5A41D3}"/>
               </a:ext>
             </a:extLst>
           </p:cNvPr>
-          <p:cNvSpPr>
-            <a:spLocks noGrp="1"/>
-          </p:cNvSpPr>
+          <p:cNvPicPr>
+            <a:picLocks noGrp="1" noChangeAspect="1"/>
+          </p:cNvPicPr>
           <p:nvPr>
             <p:ph idx="1"/>
           </p:nvPr>
-        </p:nvSpPr>
-        <p:spPr/>
-        <p:txBody>
-          <a:bodyPr/>
-          <a:lstStyle/>
-          <a:p>
-            <a:endParaRPr lang="fr-FR"/>
-          </a:p>
-        </p:txBody>
-      </p:sp>
+        </p:nvPicPr>
+        <p:blipFill>
+          <a:blip r:embed="rId2">
+            <a:extLst>
+              <a:ext uri="{28A0092B-C50C-407E-A947-70E740481C1C}">
+                <a14:useLocalDpi xmlns:a14="http://schemas.microsoft.com/office/drawing/2010/main" val="0"/>
+              </a:ext>
+            </a:extLst>
+          </a:blip>
+          <a:stretch>
+            <a:fillRect/>
+          </a:stretch>
+        </p:blipFill>
+        <p:spPr>
+          <a:xfrm>
+            <a:off x="5192898" y="2735608"/>
+            <a:ext cx="4550383" cy="2921187"/>
+          </a:xfrm>
+        </p:spPr>
+      </p:pic>
       <p:pic>
         <p:nvPicPr>
           <p:cNvPr id="4" name="Image 3">
@@ -23483,7 +25702,7 @@
           <p:nvPr/>
         </p:nvPicPr>
         <p:blipFill>
-          <a:blip r:embed="rId2">
+          <a:blip r:embed="rId3">
             <a:extLst>
               <a:ext uri="{28A0092B-C50C-407E-A947-70E740481C1C}">
                 <a14:useLocalDpi xmlns:a14="http://schemas.microsoft.com/office/drawing/2010/main" val="0"/>
@@ -23517,439 +25736,7 @@
 </p:sld>
 </file>
 
-<file path=ppt/slides/slide2.xml><?xml version="1.0" encoding="utf-8"?>
-<p:sld xmlns:a="http://schemas.openxmlformats.org/drawingml/2006/main" xmlns:r="http://schemas.openxmlformats.org/officeDocument/2006/relationships" xmlns:p="http://schemas.openxmlformats.org/presentationml/2006/main">
-  <p:cSld>
-    <p:bg>
-      <p:bgPr>
-        <a:solidFill>
-          <a:schemeClr val="bg1"/>
-        </a:solidFill>
-        <a:effectLst/>
-      </p:bgPr>
-    </p:bg>
-    <p:spTree>
-      <p:nvGrpSpPr>
-        <p:cNvPr id="1" name=""/>
-        <p:cNvGrpSpPr/>
-        <p:nvPr/>
-      </p:nvGrpSpPr>
-      <p:grpSpPr>
-        <a:xfrm>
-          <a:off x="0" y="0"/>
-          <a:ext cx="0" cy="0"/>
-          <a:chOff x="0" y="0"/>
-          <a:chExt cx="0" cy="0"/>
-        </a:xfrm>
-      </p:grpSpPr>
-      <p:sp useBgFill="1">
-        <p:nvSpPr>
-          <p:cNvPr id="9" name="Rectangle 8">
-            <a:extLst>
-              <a:ext uri="{FF2B5EF4-FFF2-40B4-BE49-F238E27FC236}">
-                <a16:creationId xmlns:a16="http://schemas.microsoft.com/office/drawing/2014/main" id="{545D489D-16E1-484D-867B-144368D74B83}"/>
-              </a:ext>
-              <a:ext uri="{C183D7F6-B498-43B3-948B-1728B52AA6E4}">
-                <adec:decorative xmlns:adec="http://schemas.microsoft.com/office/drawing/2017/decorative" val="1"/>
-              </a:ext>
-            </a:extLst>
-          </p:cNvPr>
-          <p:cNvSpPr>
-            <a:spLocks noGrp="1" noRot="1" noChangeAspect="1" noMove="1" noResize="1" noEditPoints="1" noAdjustHandles="1" noChangeArrowheads="1" noChangeShapeType="1" noTextEdit="1"/>
-          </p:cNvSpPr>
-          <p:nvPr>
-            <p:extLst>
-              <p:ext uri="{386F3935-93C4-4BCD-93E2-E3B085C9AB24}">
-                <p16:designElem xmlns:p16="http://schemas.microsoft.com/office/powerpoint/2015/main" val="1"/>
-              </p:ext>
-            </p:extLst>
-          </p:nvPr>
-        </p:nvSpPr>
-        <p:spPr>
-          <a:xfrm>
-            <a:off x="0" y="0"/>
-            <a:ext cx="12188952" cy="6858000"/>
-          </a:xfrm>
-          <a:prstGeom prst="rect">
-            <a:avLst/>
-          </a:prstGeom>
-          <a:ln>
-            <a:noFill/>
-          </a:ln>
-        </p:spPr>
-        <p:style>
-          <a:lnRef idx="2">
-            <a:schemeClr val="accent1">
-              <a:shade val="50000"/>
-            </a:schemeClr>
-          </a:lnRef>
-          <a:fillRef idx="1">
-            <a:schemeClr val="accent1"/>
-          </a:fillRef>
-          <a:effectRef idx="0">
-            <a:schemeClr val="accent1"/>
-          </a:effectRef>
-          <a:fontRef idx="minor">
-            <a:schemeClr val="lt1"/>
-          </a:fontRef>
-        </p:style>
-        <p:txBody>
-          <a:bodyPr rtlCol="0" anchor="ctr"/>
-          <a:lstStyle/>
-          <a:p>
-            <a:pPr marL="0" marR="0" lvl="0" indent="0" algn="ctr" defTabSz="914400" rtl="0" eaLnBrk="1" fontAlgn="auto" latinLnBrk="0" hangingPunct="1">
-              <a:lnSpc>
-                <a:spcPct val="100000"/>
-              </a:lnSpc>
-              <a:spcBef>
-                <a:spcPts val="0"/>
-              </a:spcBef>
-              <a:spcAft>
-                <a:spcPts val="0"/>
-              </a:spcAft>
-              <a:buClrTx/>
-              <a:buSzTx/>
-              <a:buFontTx/>
-              <a:buNone/>
-              <a:tabLst/>
-              <a:defRPr/>
-            </a:pPr>
-            <a:endParaRPr kumimoji="0" lang="en-US" sz="1800" b="0" i="0" u="none" strike="noStrike" kern="1200" cap="none" spc="0" normalizeH="0" baseline="0" noProof="0">
-              <a:ln>
-                <a:noFill/>
-              </a:ln>
-              <a:solidFill>
-                <a:prstClr val="white"/>
-              </a:solidFill>
-              <a:effectLst/>
-              <a:uLnTx/>
-              <a:uFillTx/>
-              <a:latin typeface="Calibri" panose="020F0502020204030204"/>
-              <a:ea typeface="+mn-ea"/>
-              <a:cs typeface="+mn-cs"/>
-            </a:endParaRPr>
-          </a:p>
-        </p:txBody>
-      </p:sp>
-      <p:sp>
-        <p:nvSpPr>
-          <p:cNvPr id="11" name="Rectangle 10">
-            <a:extLst>
-              <a:ext uri="{FF2B5EF4-FFF2-40B4-BE49-F238E27FC236}">
-                <a16:creationId xmlns:a16="http://schemas.microsoft.com/office/drawing/2014/main" id="{49A496F5-B01E-4BF8-9D1E-C4E53B6F9652}"/>
-              </a:ext>
-              <a:ext uri="{C183D7F6-B498-43B3-948B-1728B52AA6E4}">
-                <adec:decorative xmlns:adec="http://schemas.microsoft.com/office/drawing/2017/decorative" val="1"/>
-              </a:ext>
-            </a:extLst>
-          </p:cNvPr>
-          <p:cNvSpPr>
-            <a:spLocks noGrp="1" noRot="1" noChangeAspect="1" noMove="1" noResize="1" noEditPoints="1" noAdjustHandles="1" noChangeArrowheads="1" noChangeShapeType="1" noTextEdit="1"/>
-          </p:cNvSpPr>
-          <p:nvPr>
-            <p:extLst>
-              <p:ext uri="{386F3935-93C4-4BCD-93E2-E3B085C9AB24}">
-                <p16:designElem xmlns:p16="http://schemas.microsoft.com/office/powerpoint/2015/main" val="1"/>
-              </p:ext>
-            </p:extLst>
-          </p:nvPr>
-        </p:nvSpPr>
-        <p:spPr>
-          <a:xfrm>
-            <a:off x="0" y="0"/>
-            <a:ext cx="4522573" cy="6858000"/>
-          </a:xfrm>
-          <a:prstGeom prst="rect">
-            <a:avLst/>
-          </a:prstGeom>
-          <a:solidFill>
-            <a:schemeClr val="accent2"/>
-          </a:solidFill>
-          <a:ln>
-            <a:noFill/>
-          </a:ln>
-        </p:spPr>
-        <p:style>
-          <a:lnRef idx="2">
-            <a:schemeClr val="accent1">
-              <a:shade val="50000"/>
-            </a:schemeClr>
-          </a:lnRef>
-          <a:fillRef idx="1">
-            <a:schemeClr val="accent1"/>
-          </a:fillRef>
-          <a:effectRef idx="0">
-            <a:schemeClr val="accent1"/>
-          </a:effectRef>
-          <a:fontRef idx="minor">
-            <a:schemeClr val="lt1"/>
-          </a:fontRef>
-        </p:style>
-        <p:txBody>
-          <a:bodyPr rtlCol="0" anchor="ctr"/>
-          <a:lstStyle/>
-          <a:p>
-            <a:pPr marL="0" marR="0" lvl="0" indent="0" algn="ctr" defTabSz="914400" rtl="0" eaLnBrk="1" fontAlgn="auto" latinLnBrk="0" hangingPunct="1">
-              <a:lnSpc>
-                <a:spcPct val="100000"/>
-              </a:lnSpc>
-              <a:spcBef>
-                <a:spcPts val="0"/>
-              </a:spcBef>
-              <a:spcAft>
-                <a:spcPts val="0"/>
-              </a:spcAft>
-              <a:buClrTx/>
-              <a:buSzTx/>
-              <a:buFontTx/>
-              <a:buNone/>
-              <a:tabLst/>
-              <a:defRPr/>
-            </a:pPr>
-            <a:endParaRPr kumimoji="0" lang="en-US" sz="1800" b="0" i="0" u="none" strike="noStrike" kern="1200" cap="none" spc="0" normalizeH="0" baseline="0" noProof="0">
-              <a:ln>
-                <a:noFill/>
-              </a:ln>
-              <a:solidFill>
-                <a:prstClr val="white"/>
-              </a:solidFill>
-              <a:effectLst/>
-              <a:uLnTx/>
-              <a:uFillTx/>
-              <a:latin typeface="Calibri" panose="020F0502020204030204"/>
-              <a:ea typeface="+mn-ea"/>
-              <a:cs typeface="+mn-cs"/>
-            </a:endParaRPr>
-          </a:p>
-        </p:txBody>
-      </p:sp>
-      <p:sp>
-        <p:nvSpPr>
-          <p:cNvPr id="13" name="Arc 12">
-            <a:extLst>
-              <a:ext uri="{FF2B5EF4-FFF2-40B4-BE49-F238E27FC236}">
-                <a16:creationId xmlns:a16="http://schemas.microsoft.com/office/drawing/2014/main" id="{6E895C8D-1379-40B8-8B1B-B6F5AEAF0A6C}"/>
-              </a:ext>
-              <a:ext uri="{C183D7F6-B498-43B3-948B-1728B52AA6E4}">
-                <adec:decorative xmlns:adec="http://schemas.microsoft.com/office/drawing/2017/decorative" val="1"/>
-              </a:ext>
-            </a:extLst>
-          </p:cNvPr>
-          <p:cNvSpPr>
-            <a:spLocks noGrp="1" noRot="1" noChangeAspect="1" noMove="1" noResize="1" noEditPoints="1" noAdjustHandles="1" noChangeArrowheads="1" noChangeShapeType="1" noTextEdit="1"/>
-          </p:cNvSpPr>
-          <p:nvPr>
-            <p:extLst>
-              <p:ext uri="{386F3935-93C4-4BCD-93E2-E3B085C9AB24}">
-                <p16:designElem xmlns:p16="http://schemas.microsoft.com/office/powerpoint/2015/main" val="1"/>
-              </p:ext>
-            </p:extLst>
-          </p:nvPr>
-        </p:nvSpPr>
-        <p:spPr>
-          <a:xfrm rot="20746107">
-            <a:off x="2906963" y="1348064"/>
-            <a:ext cx="2987899" cy="2987899"/>
-          </a:xfrm>
-          <a:prstGeom prst="arc">
-            <a:avLst>
-              <a:gd name="adj1" fmla="val 14612914"/>
-              <a:gd name="adj2" fmla="val 0"/>
-            </a:avLst>
-          </a:prstGeom>
-          <a:ln w="127000" cap="rnd">
-            <a:solidFill>
-              <a:schemeClr val="accent2">
-                <a:lumMod val="75000"/>
-              </a:schemeClr>
-            </a:solidFill>
-            <a:prstDash val="dash"/>
-          </a:ln>
-        </p:spPr>
-        <p:style>
-          <a:lnRef idx="1">
-            <a:schemeClr val="accent1"/>
-          </a:lnRef>
-          <a:fillRef idx="0">
-            <a:schemeClr val="accent1"/>
-          </a:fillRef>
-          <a:effectRef idx="0">
-            <a:schemeClr val="accent1"/>
-          </a:effectRef>
-          <a:fontRef idx="minor">
-            <a:schemeClr val="tx1"/>
-          </a:fontRef>
-        </p:style>
-        <p:txBody>
-          <a:bodyPr rtlCol="0" anchor="ctr"/>
-          <a:lstStyle/>
-          <a:p>
-            <a:pPr marL="0" marR="0" lvl="0" indent="0" algn="ctr" defTabSz="914400" rtl="0" eaLnBrk="1" fontAlgn="auto" latinLnBrk="0" hangingPunct="1">
-              <a:lnSpc>
-                <a:spcPct val="100000"/>
-              </a:lnSpc>
-              <a:spcBef>
-                <a:spcPts val="0"/>
-              </a:spcBef>
-              <a:spcAft>
-                <a:spcPts val="0"/>
-              </a:spcAft>
-              <a:buClrTx/>
-              <a:buSzTx/>
-              <a:buFontTx/>
-              <a:buNone/>
-              <a:tabLst/>
-              <a:defRPr/>
-            </a:pPr>
-            <a:endParaRPr kumimoji="0" lang="en-US" sz="1800" b="0" i="0" u="none" strike="noStrike" kern="1200" cap="none" spc="0" normalizeH="0" baseline="0" noProof="0">
-              <a:ln>
-                <a:noFill/>
-              </a:ln>
-              <a:solidFill>
-                <a:srgbClr val="000000"/>
-              </a:solidFill>
-              <a:effectLst/>
-              <a:uLnTx/>
-              <a:uFillTx/>
-              <a:latin typeface="Calibri" panose="020F0502020204030204"/>
-              <a:ea typeface="+mn-ea"/>
-              <a:cs typeface="+mn-cs"/>
-            </a:endParaRPr>
-          </a:p>
-        </p:txBody>
-      </p:sp>
-      <p:sp>
-        <p:nvSpPr>
-          <p:cNvPr id="2" name="Titre 1">
-            <a:extLst>
-              <a:ext uri="{FF2B5EF4-FFF2-40B4-BE49-F238E27FC236}">
-                <a16:creationId xmlns:a16="http://schemas.microsoft.com/office/drawing/2014/main" id="{52921E90-FB47-415C-9774-517315D084DF}"/>
-              </a:ext>
-            </a:extLst>
-          </p:cNvPr>
-          <p:cNvSpPr>
-            <a:spLocks noGrp="1"/>
-          </p:cNvSpPr>
-          <p:nvPr>
-            <p:ph type="title"/>
-          </p:nvPr>
-        </p:nvSpPr>
-        <p:spPr>
-          <a:xfrm>
-            <a:off x="838200" y="643467"/>
-            <a:ext cx="2951205" cy="5571066"/>
-          </a:xfrm>
-        </p:spPr>
-        <p:txBody>
-          <a:bodyPr>
-            <a:normAutofit/>
-          </a:bodyPr>
-          <a:lstStyle/>
-          <a:p>
-            <a:r>
-              <a:rPr lang="fr-FR">
-                <a:solidFill>
-                  <a:srgbClr val="FFFFFF"/>
-                </a:solidFill>
-              </a:rPr>
-              <a:t>Sommaire</a:t>
-            </a:r>
-          </a:p>
-        </p:txBody>
-      </p:sp>
-      <p:graphicFrame>
-        <p:nvGraphicFramePr>
-          <p:cNvPr id="5" name="Espace réservé du contenu 2">
-            <a:extLst>
-              <a:ext uri="{FF2B5EF4-FFF2-40B4-BE49-F238E27FC236}">
-                <a16:creationId xmlns:a16="http://schemas.microsoft.com/office/drawing/2014/main" id="{E176FEDD-B12A-4F4F-BE67-CAE298FA7BDB}"/>
-              </a:ext>
-            </a:extLst>
-          </p:cNvPr>
-          <p:cNvGraphicFramePr>
-            <a:graphicFrameLocks noGrp="1"/>
-          </p:cNvGraphicFramePr>
-          <p:nvPr>
-            <p:ph idx="1"/>
-            <p:extLst>
-              <p:ext uri="{D42A27DB-BD31-4B8C-83A1-F6EECF244321}">
-                <p14:modId xmlns:p14="http://schemas.microsoft.com/office/powerpoint/2010/main" val="1285904286"/>
-              </p:ext>
-            </p:extLst>
-          </p:nvPr>
-        </p:nvGraphicFramePr>
-        <p:xfrm>
-          <a:off x="5237018" y="653693"/>
-          <a:ext cx="6303729" cy="5560839"/>
-        </p:xfrm>
-        <a:graphic>
-          <a:graphicData uri="http://schemas.openxmlformats.org/drawingml/2006/diagram">
-            <dgm:relIds xmlns:dgm="http://schemas.openxmlformats.org/drawingml/2006/diagram" xmlns:r="http://schemas.openxmlformats.org/officeDocument/2006/relationships" r:dm="rId2" r:lo="rId3" r:qs="rId4" r:cs="rId5"/>
-          </a:graphicData>
-        </a:graphic>
-      </p:graphicFrame>
-      <p:pic>
-        <p:nvPicPr>
-          <p:cNvPr id="8" name="Image 7">
-            <a:extLst>
-              <a:ext uri="{FF2B5EF4-FFF2-40B4-BE49-F238E27FC236}">
-                <a16:creationId xmlns:a16="http://schemas.microsoft.com/office/drawing/2014/main" id="{17502D61-96AC-4DFB-8BDB-3019BC18A705}"/>
-              </a:ext>
-            </a:extLst>
-          </p:cNvPr>
-          <p:cNvPicPr>
-            <a:picLocks noChangeAspect="1"/>
-          </p:cNvPicPr>
-          <p:nvPr/>
-        </p:nvPicPr>
-        <p:blipFill>
-          <a:blip r:embed="rId7">
-            <a:extLst>
-              <a:ext uri="{28A0092B-C50C-407E-A947-70E740481C1C}">
-                <a14:useLocalDpi xmlns:a14="http://schemas.microsoft.com/office/drawing/2010/main" val="0"/>
-              </a:ext>
-            </a:extLst>
-          </a:blip>
-          <a:stretch>
-            <a:fillRect/>
-          </a:stretch>
-        </p:blipFill>
-        <p:spPr>
-          <a:xfrm>
-            <a:off x="11476815" y="6204306"/>
-            <a:ext cx="712136" cy="653693"/>
-          </a:xfrm>
-          <a:prstGeom prst="rect">
-            <a:avLst/>
-          </a:prstGeom>
-        </p:spPr>
-      </p:pic>
-    </p:spTree>
-    <p:extLst>
-      <p:ext uri="{BB962C8B-B14F-4D97-AF65-F5344CB8AC3E}">
-        <p14:creationId xmlns:p14="http://schemas.microsoft.com/office/powerpoint/2010/main" val="3773679173"/>
-      </p:ext>
-    </p:extLst>
-  </p:cSld>
-  <p:clrMapOvr>
-    <a:masterClrMapping/>
-  </p:clrMapOvr>
-  <mc:AlternateContent xmlns:mc="http://schemas.openxmlformats.org/markup-compatibility/2006">
-    <mc:Choice xmlns:p159="http://schemas.microsoft.com/office/powerpoint/2015/09/main" Requires="p159">
-      <p:transition xmlns:p14="http://schemas.microsoft.com/office/powerpoint/2010/main" spd="slow" p14:dur="1500">
-        <p159:morph option="byObject"/>
-      </p:transition>
-    </mc:Choice>
-    <mc:Fallback>
-      <p:transition spd="slow">
-        <p:fade/>
-      </p:transition>
-    </mc:Fallback>
-  </mc:AlternateContent>
-</p:sld>
-</file>
-
-<file path=ppt/slides/slide20.xml><?xml version="1.0" encoding="utf-8"?>
+<file path=ppt/slides/slide26.xml><?xml version="1.0" encoding="utf-8"?>
 <p:sld xmlns:a="http://schemas.openxmlformats.org/drawingml/2006/main" xmlns:r="http://schemas.openxmlformats.org/officeDocument/2006/relationships" xmlns:p="http://schemas.openxmlformats.org/presentationml/2006/main">
   <p:cSld>
     <p:bg>
@@ -28108,89 +29895,6 @@
 <file path=ppt/slides/slide8.xml><?xml version="1.0" encoding="utf-8"?>
 <p:sld xmlns:a="http://schemas.openxmlformats.org/drawingml/2006/main" xmlns:r="http://schemas.openxmlformats.org/officeDocument/2006/relationships" xmlns:p="http://schemas.openxmlformats.org/presentationml/2006/main">
   <p:cSld>
-    <p:spTree>
-      <p:nvGrpSpPr>
-        <p:cNvPr id="1" name=""/>
-        <p:cNvGrpSpPr/>
-        <p:nvPr/>
-      </p:nvGrpSpPr>
-      <p:grpSpPr>
-        <a:xfrm>
-          <a:off x="0" y="0"/>
-          <a:ext cx="0" cy="0"/>
-          <a:chOff x="0" y="0"/>
-          <a:chExt cx="0" cy="0"/>
-        </a:xfrm>
-      </p:grpSpPr>
-      <p:sp>
-        <p:nvSpPr>
-          <p:cNvPr id="2" name="Titre 1">
-            <a:extLst>
-              <a:ext uri="{FF2B5EF4-FFF2-40B4-BE49-F238E27FC236}">
-                <a16:creationId xmlns:a16="http://schemas.microsoft.com/office/drawing/2014/main" id="{7BF4FEF6-3BBB-4C87-B33C-8D249CEF4B94}"/>
-              </a:ext>
-            </a:extLst>
-          </p:cNvPr>
-          <p:cNvSpPr>
-            <a:spLocks noGrp="1"/>
-          </p:cNvSpPr>
-          <p:nvPr>
-            <p:ph type="title"/>
-          </p:nvPr>
-        </p:nvSpPr>
-        <p:spPr/>
-        <p:txBody>
-          <a:bodyPr/>
-          <a:lstStyle/>
-          <a:p>
-            <a:r>
-              <a:rPr lang="fr-FR" dirty="0"/>
-              <a:t>Analyse de fond</a:t>
-            </a:r>
-          </a:p>
-        </p:txBody>
-      </p:sp>
-      <p:sp>
-        <p:nvSpPr>
-          <p:cNvPr id="3" name="Espace réservé du contenu 2">
-            <a:extLst>
-              <a:ext uri="{FF2B5EF4-FFF2-40B4-BE49-F238E27FC236}">
-                <a16:creationId xmlns:a16="http://schemas.microsoft.com/office/drawing/2014/main" id="{AB36E0FF-E15F-4A22-B15B-9197C7543AEA}"/>
-              </a:ext>
-            </a:extLst>
-          </p:cNvPr>
-          <p:cNvSpPr>
-            <a:spLocks noGrp="1"/>
-          </p:cNvSpPr>
-          <p:nvPr>
-            <p:ph idx="1"/>
-          </p:nvPr>
-        </p:nvSpPr>
-        <p:spPr/>
-        <p:txBody>
-          <a:bodyPr/>
-          <a:lstStyle/>
-          <a:p>
-            <a:endParaRPr lang="fr-FR"/>
-          </a:p>
-        </p:txBody>
-      </p:sp>
-    </p:spTree>
-    <p:extLst>
-      <p:ext uri="{BB962C8B-B14F-4D97-AF65-F5344CB8AC3E}">
-        <p14:creationId xmlns:p14="http://schemas.microsoft.com/office/powerpoint/2010/main" val="3443617644"/>
-      </p:ext>
-    </p:extLst>
-  </p:cSld>
-  <p:clrMapOvr>
-    <a:masterClrMapping/>
-  </p:clrMapOvr>
-</p:sld>
-</file>
-
-<file path=ppt/slides/slide9.xml><?xml version="1.0" encoding="utf-8"?>
-<p:sld xmlns:a="http://schemas.openxmlformats.org/drawingml/2006/main" xmlns:r="http://schemas.openxmlformats.org/officeDocument/2006/relationships" xmlns:p="http://schemas.openxmlformats.org/presentationml/2006/main">
-  <p:cSld>
     <p:bg>
       <p:bgPr>
         <a:solidFill>
@@ -28213,12 +29917,12 @@
           <a:chExt cx="0" cy="0"/>
         </a:xfrm>
       </p:grpSpPr>
-      <p:sp>
+      <p:sp useBgFill="1">
         <p:nvSpPr>
-          <p:cNvPr id="26" name="Freeform: Shape 25">
+          <p:cNvPr id="18" name="Rectangle 17">
             <a:extLst>
               <a:ext uri="{FF2B5EF4-FFF2-40B4-BE49-F238E27FC236}">
-                <a16:creationId xmlns:a16="http://schemas.microsoft.com/office/drawing/2014/main" id="{8A7BA06D-B3FF-4E91-8639-B4569AE3AA23}"/>
+                <a16:creationId xmlns:a16="http://schemas.microsoft.com/office/drawing/2014/main" id="{FAF68CB5-D519-4070-A998-B86F0FBCD10C}"/>
               </a:ext>
               <a:ext uri="{C183D7F6-B498-43B3-948B-1728B52AA6E4}">
                 <adec:decorative xmlns:adec="http://schemas.microsoft.com/office/drawing/2017/decorative" val="1"/>
@@ -28238,43 +29942,12 @@
         </p:nvSpPr>
         <p:spPr>
           <a:xfrm>
-            <a:off x="10208695" y="1"/>
-            <a:ext cx="1135066" cy="477997"/>
+            <a:off x="1" y="0"/>
+            <a:ext cx="12192000" cy="6858000"/>
           </a:xfrm>
-          <a:custGeom>
+          <a:prstGeom prst="rect">
             <a:avLst/>
-            <a:gdLst/>
-            <a:ahLst/>
-            <a:cxnLst/>
-            <a:rect l="l" t="t" r="r" b="b"/>
-            <a:pathLst>
-              <a:path w="1135066" h="477997">
-                <a:moveTo>
-                  <a:pt x="0" y="0"/>
-                </a:moveTo>
-                <a:lnTo>
-                  <a:pt x="1135066" y="0"/>
-                </a:lnTo>
-                <a:lnTo>
-                  <a:pt x="1133370" y="16827"/>
-                </a:lnTo>
-                <a:cubicBezTo>
-                  <a:pt x="1079514" y="280016"/>
-                  <a:pt x="846644" y="477997"/>
-                  <a:pt x="567533" y="477997"/>
-                </a:cubicBezTo>
-                <a:cubicBezTo>
-                  <a:pt x="288422" y="477997"/>
-                  <a:pt x="55552" y="280016"/>
-                  <a:pt x="1696" y="16827"/>
-                </a:cubicBezTo>
-                <a:close/>
-              </a:path>
-            </a:pathLst>
-          </a:custGeom>
-          <a:solidFill>
-            <a:schemeClr val="accent4"/>
-          </a:solidFill>
+          </a:prstGeom>
           <a:ln>
             <a:noFill/>
           </a:ln>
@@ -28296,9 +29969,7 @@
           </a:fontRef>
         </p:style>
         <p:txBody>
-          <a:bodyPr wrap="square" rtlCol="0" anchor="ctr">
-            <a:noAutofit/>
-          </a:bodyPr>
+          <a:bodyPr rtlCol="0" anchor="ctr"/>
           <a:lstStyle/>
           <a:p>
             <a:pPr marL="0" marR="0" lvl="0" indent="0" algn="ctr" defTabSz="914400" rtl="0" eaLnBrk="1" fontAlgn="auto" latinLnBrk="0" hangingPunct="1">
@@ -28335,12 +30006,304 @@
           </a:p>
         </p:txBody>
       </p:sp>
+      <p:pic>
+        <p:nvPicPr>
+          <p:cNvPr id="9" name="Image 8">
+            <a:extLst>
+              <a:ext uri="{FF2B5EF4-FFF2-40B4-BE49-F238E27FC236}">
+                <a16:creationId xmlns:a16="http://schemas.microsoft.com/office/drawing/2014/main" id="{B9DCBCE3-0D73-4A3A-8BCF-395BEBF46DCA}"/>
+              </a:ext>
+            </a:extLst>
+          </p:cNvPr>
+          <p:cNvPicPr>
+            <a:picLocks noChangeAspect="1"/>
+          </p:cNvPicPr>
+          <p:nvPr/>
+        </p:nvPicPr>
+        <p:blipFill rotWithShape="1">
+          <a:blip r:embed="rId2"/>
+          <a:srcRect l="3418" r="66970" b="1"/>
+          <a:stretch/>
+        </p:blipFill>
+        <p:spPr>
+          <a:xfrm>
+            <a:off x="264987" y="426762"/>
+            <a:ext cx="3124798" cy="2769973"/>
+          </a:xfrm>
+          <a:custGeom>
+            <a:avLst/>
+            <a:gdLst/>
+            <a:ahLst/>
+            <a:cxnLst/>
+            <a:rect l="l" t="t" r="r" b="b"/>
+            <a:pathLst>
+              <a:path w="2769973" h="2769973">
+                <a:moveTo>
+                  <a:pt x="133430" y="0"/>
+                </a:moveTo>
+                <a:lnTo>
+                  <a:pt x="2636543" y="0"/>
+                </a:lnTo>
+                <a:cubicBezTo>
+                  <a:pt x="2710234" y="0"/>
+                  <a:pt x="2769973" y="59739"/>
+                  <a:pt x="2769973" y="133430"/>
+                </a:cubicBezTo>
+                <a:lnTo>
+                  <a:pt x="2769973" y="2636543"/>
+                </a:lnTo>
+                <a:cubicBezTo>
+                  <a:pt x="2769973" y="2710234"/>
+                  <a:pt x="2710234" y="2769973"/>
+                  <a:pt x="2636543" y="2769973"/>
+                </a:cubicBezTo>
+                <a:lnTo>
+                  <a:pt x="133430" y="2769973"/>
+                </a:lnTo>
+                <a:cubicBezTo>
+                  <a:pt x="59739" y="2769973"/>
+                  <a:pt x="0" y="2710234"/>
+                  <a:pt x="0" y="2636543"/>
+                </a:cubicBezTo>
+                <a:lnTo>
+                  <a:pt x="0" y="133430"/>
+                </a:lnTo>
+                <a:cubicBezTo>
+                  <a:pt x="0" y="59739"/>
+                  <a:pt x="59739" y="0"/>
+                  <a:pt x="133430" y="0"/>
+                </a:cubicBezTo>
+                <a:close/>
+              </a:path>
+            </a:pathLst>
+          </a:custGeom>
+        </p:spPr>
+      </p:pic>
+      <p:pic>
+        <p:nvPicPr>
+          <p:cNvPr id="11" name="Image 10">
+            <a:extLst>
+              <a:ext uri="{FF2B5EF4-FFF2-40B4-BE49-F238E27FC236}">
+                <a16:creationId xmlns:a16="http://schemas.microsoft.com/office/drawing/2014/main" id="{C67C29A2-A2BC-4C09-BA04-7D01A205BEC8}"/>
+              </a:ext>
+            </a:extLst>
+          </p:cNvPr>
+          <p:cNvPicPr>
+            <a:picLocks noChangeAspect="1"/>
+          </p:cNvPicPr>
+          <p:nvPr/>
+        </p:nvPicPr>
+        <p:blipFill rotWithShape="1">
+          <a:blip r:embed="rId3"/>
+          <a:srcRect l="3552" r="66553" b="1"/>
+          <a:stretch/>
+        </p:blipFill>
+        <p:spPr>
+          <a:xfrm>
+            <a:off x="3643952" y="426760"/>
+            <a:ext cx="3124798" cy="2769973"/>
+          </a:xfrm>
+          <a:custGeom>
+            <a:avLst/>
+            <a:gdLst/>
+            <a:ahLst/>
+            <a:cxnLst/>
+            <a:rect l="l" t="t" r="r" b="b"/>
+            <a:pathLst>
+              <a:path w="2683042" h="2683042">
+                <a:moveTo>
+                  <a:pt x="102278" y="0"/>
+                </a:moveTo>
+                <a:lnTo>
+                  <a:pt x="2580764" y="0"/>
+                </a:lnTo>
+                <a:cubicBezTo>
+                  <a:pt x="2637251" y="0"/>
+                  <a:pt x="2683042" y="45791"/>
+                  <a:pt x="2683042" y="102278"/>
+                </a:cubicBezTo>
+                <a:lnTo>
+                  <a:pt x="2683042" y="2580764"/>
+                </a:lnTo>
+                <a:cubicBezTo>
+                  <a:pt x="2683042" y="2637251"/>
+                  <a:pt x="2637251" y="2683042"/>
+                  <a:pt x="2580764" y="2683042"/>
+                </a:cubicBezTo>
+                <a:lnTo>
+                  <a:pt x="102278" y="2683042"/>
+                </a:lnTo>
+                <a:cubicBezTo>
+                  <a:pt x="45791" y="2683042"/>
+                  <a:pt x="0" y="2637251"/>
+                  <a:pt x="0" y="2580764"/>
+                </a:cubicBezTo>
+                <a:lnTo>
+                  <a:pt x="0" y="102278"/>
+                </a:lnTo>
+                <a:cubicBezTo>
+                  <a:pt x="0" y="45791"/>
+                  <a:pt x="45791" y="0"/>
+                  <a:pt x="102278" y="0"/>
+                </a:cubicBezTo>
+                <a:close/>
+              </a:path>
+            </a:pathLst>
+          </a:custGeom>
+        </p:spPr>
+      </p:pic>
+      <p:pic>
+        <p:nvPicPr>
+          <p:cNvPr id="5" name="Espace réservé du contenu 4">
+            <a:extLst>
+              <a:ext uri="{FF2B5EF4-FFF2-40B4-BE49-F238E27FC236}">
+                <a16:creationId xmlns:a16="http://schemas.microsoft.com/office/drawing/2014/main" id="{366959C1-E167-4774-B106-7CEF91291016}"/>
+              </a:ext>
+            </a:extLst>
+          </p:cNvPr>
+          <p:cNvPicPr>
+            <a:picLocks noChangeAspect="1"/>
+          </p:cNvPicPr>
+          <p:nvPr/>
+        </p:nvPicPr>
+        <p:blipFill rotWithShape="1">
+          <a:blip r:embed="rId4"/>
+          <a:srcRect l="5400" r="65552"/>
+          <a:stretch/>
+        </p:blipFill>
+        <p:spPr>
+          <a:xfrm>
+            <a:off x="264987" y="3429005"/>
+            <a:ext cx="3124798" cy="2769973"/>
+          </a:xfrm>
+          <a:custGeom>
+            <a:avLst/>
+            <a:gdLst/>
+            <a:ahLst/>
+            <a:cxnLst/>
+            <a:rect l="l" t="t" r="r" b="b"/>
+            <a:pathLst>
+              <a:path w="2683042" h="2683042">
+                <a:moveTo>
+                  <a:pt x="102278" y="0"/>
+                </a:moveTo>
+                <a:lnTo>
+                  <a:pt x="2580764" y="0"/>
+                </a:lnTo>
+                <a:cubicBezTo>
+                  <a:pt x="2637251" y="0"/>
+                  <a:pt x="2683042" y="45791"/>
+                  <a:pt x="2683042" y="102278"/>
+                </a:cubicBezTo>
+                <a:lnTo>
+                  <a:pt x="2683042" y="2580764"/>
+                </a:lnTo>
+                <a:cubicBezTo>
+                  <a:pt x="2683042" y="2637251"/>
+                  <a:pt x="2637251" y="2683042"/>
+                  <a:pt x="2580764" y="2683042"/>
+                </a:cubicBezTo>
+                <a:lnTo>
+                  <a:pt x="102278" y="2683042"/>
+                </a:lnTo>
+                <a:cubicBezTo>
+                  <a:pt x="45791" y="2683042"/>
+                  <a:pt x="0" y="2637251"/>
+                  <a:pt x="0" y="2580764"/>
+                </a:cubicBezTo>
+                <a:lnTo>
+                  <a:pt x="0" y="102278"/>
+                </a:lnTo>
+                <a:cubicBezTo>
+                  <a:pt x="0" y="45791"/>
+                  <a:pt x="45791" y="0"/>
+                  <a:pt x="102278" y="0"/>
+                </a:cubicBezTo>
+                <a:close/>
+              </a:path>
+            </a:pathLst>
+          </a:custGeom>
+        </p:spPr>
+      </p:pic>
+      <p:pic>
+        <p:nvPicPr>
+          <p:cNvPr id="7" name="Image 6">
+            <a:extLst>
+              <a:ext uri="{FF2B5EF4-FFF2-40B4-BE49-F238E27FC236}">
+                <a16:creationId xmlns:a16="http://schemas.microsoft.com/office/drawing/2014/main" id="{77E7960D-DFB6-4387-8F40-F7842CD4E240}"/>
+              </a:ext>
+            </a:extLst>
+          </p:cNvPr>
+          <p:cNvPicPr>
+            <a:picLocks noChangeAspect="1"/>
+          </p:cNvPicPr>
+          <p:nvPr/>
+        </p:nvPicPr>
+        <p:blipFill rotWithShape="1">
+          <a:blip r:embed="rId5"/>
+          <a:srcRect l="2273" r="68396" b="-1"/>
+          <a:stretch/>
+        </p:blipFill>
+        <p:spPr>
+          <a:xfrm>
+            <a:off x="3643952" y="3428991"/>
+            <a:ext cx="3124798" cy="2769974"/>
+          </a:xfrm>
+          <a:custGeom>
+            <a:avLst/>
+            <a:gdLst/>
+            <a:ahLst/>
+            <a:cxnLst/>
+            <a:rect l="l" t="t" r="r" b="b"/>
+            <a:pathLst>
+              <a:path w="3118718" h="3118719">
+                <a:moveTo>
+                  <a:pt x="127306" y="0"/>
+                </a:moveTo>
+                <a:lnTo>
+                  <a:pt x="2991412" y="0"/>
+                </a:lnTo>
+                <a:cubicBezTo>
+                  <a:pt x="3061721" y="0"/>
+                  <a:pt x="3118718" y="56997"/>
+                  <a:pt x="3118718" y="127306"/>
+                </a:cubicBezTo>
+                <a:lnTo>
+                  <a:pt x="3118718" y="2991413"/>
+                </a:lnTo>
+                <a:cubicBezTo>
+                  <a:pt x="3118718" y="3061722"/>
+                  <a:pt x="3061721" y="3118719"/>
+                  <a:pt x="2991412" y="3118719"/>
+                </a:cubicBezTo>
+                <a:lnTo>
+                  <a:pt x="127306" y="3118719"/>
+                </a:lnTo>
+                <a:cubicBezTo>
+                  <a:pt x="56997" y="3118719"/>
+                  <a:pt x="0" y="3061722"/>
+                  <a:pt x="0" y="2991413"/>
+                </a:cubicBezTo>
+                <a:lnTo>
+                  <a:pt x="0" y="127306"/>
+                </a:lnTo>
+                <a:cubicBezTo>
+                  <a:pt x="0" y="56997"/>
+                  <a:pt x="56997" y="0"/>
+                  <a:pt x="127306" y="0"/>
+                </a:cubicBezTo>
+                <a:close/>
+              </a:path>
+            </a:pathLst>
+          </a:custGeom>
+        </p:spPr>
+      </p:pic>
       <p:sp>
         <p:nvSpPr>
-          <p:cNvPr id="28" name="Arc 27">
+          <p:cNvPr id="20" name="Arc 19">
             <a:extLst>
               <a:ext uri="{FF2B5EF4-FFF2-40B4-BE49-F238E27FC236}">
-                <a16:creationId xmlns:a16="http://schemas.microsoft.com/office/drawing/2014/main" id="{2B30C86D-5A07-48BC-9C9D-6F9A2DB1E9E1}"/>
+                <a16:creationId xmlns:a16="http://schemas.microsoft.com/office/drawing/2014/main" id="{7586665A-47B3-4AEE-BC94-15D89FF706B3}"/>
               </a:ext>
               <a:ext uri="{C183D7F6-B498-43B3-948B-1728B52AA6E4}">
                 <adec:decorative xmlns:adec="http://schemas.microsoft.com/office/drawing/2017/decorative" val="1"/>
@@ -28359,8 +30322,8 @@
           </p:nvPr>
         </p:nvSpPr>
         <p:spPr>
-          <a:xfrm rot="10800000" flipV="1">
-            <a:off x="555710" y="1064829"/>
+          <a:xfrm rot="336468">
+            <a:off x="7783403" y="326268"/>
             <a:ext cx="4083433" cy="4083433"/>
           </a:xfrm>
           <a:prstGeom prst="arc">
@@ -28425,299 +30388,12 @@
           </a:p>
         </p:txBody>
       </p:sp>
-      <p:sp useBgFill="1">
-        <p:nvSpPr>
-          <p:cNvPr id="30" name="Rectangle 29">
-            <a:extLst>
-              <a:ext uri="{FF2B5EF4-FFF2-40B4-BE49-F238E27FC236}">
-                <a16:creationId xmlns:a16="http://schemas.microsoft.com/office/drawing/2014/main" id="{F101C3BA-9804-47C4-8BCA-EC15FAD15885}"/>
-              </a:ext>
-              <a:ext uri="{C183D7F6-B498-43B3-948B-1728B52AA6E4}">
-                <adec:decorative xmlns:adec="http://schemas.microsoft.com/office/drawing/2017/decorative" val="1"/>
-              </a:ext>
-            </a:extLst>
-          </p:cNvPr>
-          <p:cNvSpPr>
-            <a:spLocks noGrp="1" noRot="1" noChangeAspect="1" noMove="1" noResize="1" noEditPoints="1" noAdjustHandles="1" noChangeArrowheads="1" noChangeShapeType="1" noTextEdit="1"/>
-          </p:cNvSpPr>
-          <p:nvPr>
-            <p:extLst>
-              <p:ext uri="{386F3935-93C4-4BCD-93E2-E3B085C9AB24}">
-                <p16:designElem xmlns:p16="http://schemas.microsoft.com/office/powerpoint/2015/main" val="1"/>
-              </p:ext>
-            </p:extLst>
-          </p:nvPr>
-        </p:nvSpPr>
-        <p:spPr>
-          <a:xfrm>
-            <a:off x="0" y="0"/>
-            <a:ext cx="12192000" cy="6858000"/>
-          </a:xfrm>
-          <a:prstGeom prst="rect">
-            <a:avLst/>
-          </a:prstGeom>
-          <a:ln w="12700" cap="flat" cmpd="sng" algn="ctr">
-            <a:noFill/>
-            <a:prstDash val="solid"/>
-            <a:miter lim="800000"/>
-          </a:ln>
-          <a:effectLst/>
-          <a:extLst>
-            <a:ext uri="{91240B29-F687-4F45-9708-019B960494DF}">
-              <a14:hiddenLine xmlns:a14="http://schemas.microsoft.com/office/drawing/2010/main" w="12700" cap="flat" cmpd="sng" algn="ctr">
-                <a:solidFill>
-                  <a:schemeClr val="accent1">
-                    <a:shade val="50000"/>
-                  </a:schemeClr>
-                </a:solidFill>
-                <a:prstDash val="solid"/>
-                <a:miter lim="800000"/>
-              </a14:hiddenLine>
-            </a:ext>
-          </a:extLst>
-        </p:spPr>
-        <p:style>
-          <a:lnRef idx="2">
-            <a:schemeClr val="accent1">
-              <a:shade val="50000"/>
-            </a:schemeClr>
-          </a:lnRef>
-          <a:fillRef idx="1">
-            <a:schemeClr val="accent1"/>
-          </a:fillRef>
-          <a:effectRef idx="0">
-            <a:schemeClr val="accent1"/>
-          </a:effectRef>
-          <a:fontRef idx="minor">
-            <a:schemeClr val="lt1"/>
-          </a:fontRef>
-        </p:style>
-        <p:txBody>
-          <a:bodyPr rtlCol="0" anchor="ctr"/>
-          <a:lstStyle/>
-          <a:p>
-            <a:pPr algn="ctr"/>
-            <a:endParaRPr lang="en-US"/>
-          </a:p>
-        </p:txBody>
-      </p:sp>
-      <p:pic>
-        <p:nvPicPr>
-          <p:cNvPr id="5" name="Picture 4" descr="Graphs on a display with reflection of office">
-            <a:extLst>
-              <a:ext uri="{FF2B5EF4-FFF2-40B4-BE49-F238E27FC236}">
-                <a16:creationId xmlns:a16="http://schemas.microsoft.com/office/drawing/2014/main" id="{F2438316-901D-4DF4-A398-32CB0F4AE951}"/>
-              </a:ext>
-            </a:extLst>
-          </p:cNvPr>
-          <p:cNvPicPr>
-            <a:picLocks noChangeAspect="1"/>
-          </p:cNvPicPr>
-          <p:nvPr/>
-        </p:nvPicPr>
-        <p:blipFill rotWithShape="1">
-          <a:blip r:embed="rId2"/>
-          <a:srcRect t="10245" r="-1" b="5463"/>
-          <a:stretch/>
-        </p:blipFill>
-        <p:spPr>
-          <a:xfrm>
-            <a:off x="20" y="10"/>
-            <a:ext cx="12188932" cy="6857989"/>
-          </a:xfrm>
-          <a:prstGeom prst="rect">
-            <a:avLst/>
-          </a:prstGeom>
-        </p:spPr>
-      </p:pic>
-      <p:sp useBgFill="1">
-        <p:nvSpPr>
-          <p:cNvPr id="32" name="Rectangle 31">
-            <a:extLst>
-              <a:ext uri="{FF2B5EF4-FFF2-40B4-BE49-F238E27FC236}">
-                <a16:creationId xmlns:a16="http://schemas.microsoft.com/office/drawing/2014/main" id="{A34066D6-1B59-4642-A86D-39464CEE971B}"/>
-              </a:ext>
-              <a:ext uri="{C183D7F6-B498-43B3-948B-1728B52AA6E4}">
-                <adec:decorative xmlns:adec="http://schemas.microsoft.com/office/drawing/2017/decorative" val="1"/>
-              </a:ext>
-            </a:extLst>
-          </p:cNvPr>
-          <p:cNvSpPr>
-            <a:spLocks noGrp="1" noRot="1" noChangeAspect="1" noMove="1" noResize="1" noEditPoints="1" noAdjustHandles="1" noChangeArrowheads="1" noChangeShapeType="1" noTextEdit="1"/>
-          </p:cNvSpPr>
-          <p:nvPr>
-            <p:extLst>
-              <p:ext uri="{386F3935-93C4-4BCD-93E2-E3B085C9AB24}">
-                <p16:designElem xmlns:p16="http://schemas.microsoft.com/office/powerpoint/2015/main" val="1"/>
-              </p:ext>
-            </p:extLst>
-          </p:nvPr>
-        </p:nvSpPr>
-        <p:spPr>
-          <a:xfrm>
-            <a:off x="-3048" y="-4"/>
-            <a:ext cx="4712144" cy="6858004"/>
-          </a:xfrm>
-          <a:prstGeom prst="rect">
-            <a:avLst/>
-          </a:prstGeom>
-          <a:ln>
-            <a:noFill/>
-          </a:ln>
-        </p:spPr>
-        <p:style>
-          <a:lnRef idx="2">
-            <a:schemeClr val="accent1">
-              <a:shade val="50000"/>
-            </a:schemeClr>
-          </a:lnRef>
-          <a:fillRef idx="1">
-            <a:schemeClr val="accent1"/>
-          </a:fillRef>
-          <a:effectRef idx="0">
-            <a:schemeClr val="accent1"/>
-          </a:effectRef>
-          <a:fontRef idx="minor">
-            <a:schemeClr val="lt1"/>
-          </a:fontRef>
-        </p:style>
-        <p:txBody>
-          <a:bodyPr rtlCol="0" anchor="ctr"/>
-          <a:lstStyle/>
-          <a:p>
-            <a:pPr marL="0" marR="0" lvl="0" indent="0" algn="ctr" defTabSz="914400" rtl="0" eaLnBrk="1" fontAlgn="auto" latinLnBrk="0" hangingPunct="1">
-              <a:lnSpc>
-                <a:spcPct val="100000"/>
-              </a:lnSpc>
-              <a:spcBef>
-                <a:spcPts val="0"/>
-              </a:spcBef>
-              <a:spcAft>
-                <a:spcPts val="0"/>
-              </a:spcAft>
-              <a:buClrTx/>
-              <a:buSzTx/>
-              <a:buFontTx/>
-              <a:buNone/>
-              <a:tabLst/>
-              <a:defRPr/>
-            </a:pPr>
-            <a:endParaRPr kumimoji="0" lang="en-US" sz="1800" b="0" i="0" u="none" strike="noStrike" kern="1200" cap="none" spc="0" normalizeH="0" baseline="0" noProof="0">
-              <a:ln>
-                <a:noFill/>
-              </a:ln>
-              <a:solidFill>
-                <a:prstClr val="white"/>
-              </a:solidFill>
-              <a:effectLst/>
-              <a:uLnTx/>
-              <a:uFillTx/>
-              <a:latin typeface="Calibri" panose="020F0502020204030204"/>
-              <a:ea typeface="+mn-ea"/>
-              <a:cs typeface="+mn-cs"/>
-            </a:endParaRPr>
-          </a:p>
-        </p:txBody>
-      </p:sp>
-      <p:sp>
-        <p:nvSpPr>
-          <p:cNvPr id="34" name="Arc 33">
-            <a:extLst>
-              <a:ext uri="{FF2B5EF4-FFF2-40B4-BE49-F238E27FC236}">
-                <a16:creationId xmlns:a16="http://schemas.microsoft.com/office/drawing/2014/main" id="{18E928D9-3091-4385-B979-265D55AD02CE}"/>
-              </a:ext>
-              <a:ext uri="{C183D7F6-B498-43B3-948B-1728B52AA6E4}">
-                <adec:decorative xmlns:adec="http://schemas.microsoft.com/office/drawing/2017/decorative" val="1"/>
-              </a:ext>
-            </a:extLst>
-          </p:cNvPr>
-          <p:cNvSpPr>
-            <a:spLocks noGrp="1" noRot="1" noChangeAspect="1" noMove="1" noResize="1" noEditPoints="1" noAdjustHandles="1" noChangeArrowheads="1" noChangeShapeType="1" noTextEdit="1"/>
-          </p:cNvSpPr>
-          <p:nvPr>
-            <p:extLst>
-              <p:ext uri="{386F3935-93C4-4BCD-93E2-E3B085C9AB24}">
-                <p16:designElem xmlns:p16="http://schemas.microsoft.com/office/powerpoint/2015/main" val="1"/>
-              </p:ext>
-            </p:extLst>
-          </p:nvPr>
-        </p:nvSpPr>
-        <p:spPr>
-          <a:xfrm rot="303011">
-            <a:off x="1155661" y="700861"/>
-            <a:ext cx="2987899" cy="2987899"/>
-          </a:xfrm>
-          <a:prstGeom prst="arc">
-            <a:avLst>
-              <a:gd name="adj1" fmla="val 14612914"/>
-              <a:gd name="adj2" fmla="val 0"/>
-            </a:avLst>
-          </a:prstGeom>
-          <a:ln w="127000" cap="rnd">
-            <a:solidFill>
-              <a:schemeClr val="accent4"/>
-            </a:solidFill>
-            <a:prstDash val="dash"/>
-          </a:ln>
-        </p:spPr>
-        <p:style>
-          <a:lnRef idx="1">
-            <a:schemeClr val="accent1"/>
-          </a:lnRef>
-          <a:fillRef idx="0">
-            <a:schemeClr val="accent1"/>
-          </a:fillRef>
-          <a:effectRef idx="0">
-            <a:schemeClr val="accent1"/>
-          </a:effectRef>
-          <a:fontRef idx="minor">
-            <a:schemeClr val="tx1"/>
-          </a:fontRef>
-        </p:style>
-        <p:txBody>
-          <a:bodyPr rtlCol="0" anchor="ctr"/>
-          <a:lstStyle/>
-          <a:p>
-            <a:pPr marL="0" marR="0" lvl="0" indent="0" algn="ctr" defTabSz="914400" rtl="0" eaLnBrk="1" fontAlgn="auto" latinLnBrk="0" hangingPunct="1">
-              <a:lnSpc>
-                <a:spcPct val="100000"/>
-              </a:lnSpc>
-              <a:spcBef>
-                <a:spcPts val="0"/>
-              </a:spcBef>
-              <a:spcAft>
-                <a:spcPts val="0"/>
-              </a:spcAft>
-              <a:buClrTx/>
-              <a:buSzTx/>
-              <a:buFontTx/>
-              <a:buNone/>
-              <a:tabLst/>
-              <a:defRPr/>
-            </a:pPr>
-            <a:endParaRPr kumimoji="0" lang="en-US" sz="1800" b="0" i="0" u="none" strike="noStrike" kern="1200" cap="none" spc="0" normalizeH="0" baseline="0" noProof="0">
-              <a:ln>
-                <a:noFill/>
-              </a:ln>
-              <a:solidFill>
-                <a:srgbClr val="000000"/>
-              </a:solidFill>
-              <a:effectLst/>
-              <a:uLnTx/>
-              <a:uFillTx/>
-              <a:latin typeface="Calibri" panose="020F0502020204030204"/>
-              <a:ea typeface="+mn-ea"/>
-              <a:cs typeface="+mn-cs"/>
-            </a:endParaRPr>
-          </a:p>
-        </p:txBody>
-      </p:sp>
       <p:sp>
         <p:nvSpPr>
           <p:cNvPr id="2" name="Titre 1">
             <a:extLst>
               <a:ext uri="{FF2B5EF4-FFF2-40B4-BE49-F238E27FC236}">
-                <a16:creationId xmlns:a16="http://schemas.microsoft.com/office/drawing/2014/main" id="{DF6D2867-1365-4479-B903-7D2D530B4AC6}"/>
+                <a16:creationId xmlns:a16="http://schemas.microsoft.com/office/drawing/2014/main" id="{7BF4FEF6-3BBB-4C87-B33C-8D249CEF4B94}"/>
               </a:ext>
             </a:extLst>
           </p:cNvPr>
@@ -28730,252 +30406,163 @@
         </p:nvSpPr>
         <p:spPr>
           <a:xfrm>
-            <a:off x="643468" y="795509"/>
-            <a:ext cx="3489261" cy="2798604"/>
+            <a:off x="7256721" y="486184"/>
+            <a:ext cx="4291810" cy="1325563"/>
           </a:xfrm>
         </p:spPr>
         <p:txBody>
-          <a:bodyPr vert="horz" lIns="91440" tIns="45720" rIns="91440" bIns="45720" rtlCol="0" anchor="b">
+          <a:bodyPr>
             <a:normAutofit/>
           </a:bodyPr>
           <a:lstStyle/>
           <a:p>
-            <a:pPr algn="ctr"/>
             <a:r>
-              <a:rPr lang="en-US" sz="5000" kern="1200" dirty="0" err="1">
-                <a:solidFill>
-                  <a:schemeClr val="tx1"/>
-                </a:solidFill>
-                <a:latin typeface="+mj-lt"/>
-                <a:ea typeface="+mj-ea"/>
-                <a:cs typeface="+mj-cs"/>
-              </a:rPr>
-              <a:t>Traitement</a:t>
+              <a:rPr lang="fr-FR" dirty="0"/>
+              <a:t>Analyse de fond</a:t>
             </a:r>
-            <a:r>
-              <a:rPr lang="en-US" sz="5000" kern="1200" dirty="0">
-                <a:solidFill>
-                  <a:schemeClr val="tx1"/>
-                </a:solidFill>
-                <a:latin typeface="+mj-lt"/>
-                <a:ea typeface="+mj-ea"/>
-                <a:cs typeface="+mj-cs"/>
-              </a:rPr>
-              <a:t> du jeu de </a:t>
-            </a:r>
-            <a:r>
-              <a:rPr lang="en-US" sz="5000" kern="1200" dirty="0" err="1">
-                <a:solidFill>
-                  <a:schemeClr val="tx1"/>
-                </a:solidFill>
-                <a:latin typeface="+mj-lt"/>
-                <a:ea typeface="+mj-ea"/>
-                <a:cs typeface="+mj-cs"/>
-              </a:rPr>
-              <a:t>données</a:t>
-            </a:r>
-            <a:endParaRPr lang="en-US" sz="5000" kern="1200" dirty="0">
-              <a:solidFill>
-                <a:schemeClr val="tx1"/>
-              </a:solidFill>
-              <a:latin typeface="+mj-lt"/>
-              <a:ea typeface="+mj-ea"/>
-              <a:cs typeface="+mj-cs"/>
-            </a:endParaRPr>
           </a:p>
         </p:txBody>
       </p:sp>
       <p:sp>
         <p:nvSpPr>
-          <p:cNvPr id="36" name="Oval 35">
+          <p:cNvPr id="15" name="Content Placeholder 14">
             <a:extLst>
               <a:ext uri="{FF2B5EF4-FFF2-40B4-BE49-F238E27FC236}">
-                <a16:creationId xmlns:a16="http://schemas.microsoft.com/office/drawing/2014/main" id="{7D602432-D774-4CF5-94E8-7D52D01059D2}"/>
-              </a:ext>
-              <a:ext uri="{C183D7F6-B498-43B3-948B-1728B52AA6E4}">
-                <adec:decorative xmlns:adec="http://schemas.microsoft.com/office/drawing/2017/decorative" val="1"/>
+                <a16:creationId xmlns:a16="http://schemas.microsoft.com/office/drawing/2014/main" id="{9A184F93-D965-4293-B797-CB6E2C70B7C9}"/>
               </a:ext>
             </a:extLst>
           </p:cNvPr>
           <p:cNvSpPr>
-            <a:spLocks noGrp="1" noRot="1" noChangeAspect="1" noMove="1" noResize="1" noEditPoints="1" noAdjustHandles="1" noChangeArrowheads="1" noChangeShapeType="1" noTextEdit="1"/>
+            <a:spLocks noGrp="1"/>
           </p:cNvSpPr>
           <p:nvPr>
-            <p:extLst>
-              <p:ext uri="{386F3935-93C4-4BCD-93E2-E3B085C9AB24}">
-                <p16:designElem xmlns:p16="http://schemas.microsoft.com/office/powerpoint/2015/main" val="1"/>
-              </p:ext>
-            </p:extLst>
+            <p:ph idx="1"/>
           </p:nvPr>
         </p:nvSpPr>
         <p:spPr>
           <a:xfrm>
-            <a:off x="638194" y="4626633"/>
-            <a:ext cx="491961" cy="491961"/>
+            <a:off x="7256721" y="1946684"/>
+            <a:ext cx="4291810" cy="4351338"/>
           </a:xfrm>
-          <a:prstGeom prst="ellipse">
-            <a:avLst/>
-          </a:prstGeom>
-          <a:solidFill>
-            <a:schemeClr val="accent5"/>
-          </a:solidFill>
-          <a:ln>
-            <a:noFill/>
-          </a:ln>
         </p:spPr>
-        <p:style>
-          <a:lnRef idx="2">
-            <a:schemeClr val="accent1">
-              <a:shade val="50000"/>
-            </a:schemeClr>
-          </a:lnRef>
-          <a:fillRef idx="1">
-            <a:schemeClr val="accent1"/>
-          </a:fillRef>
-          <a:effectRef idx="0">
-            <a:schemeClr val="accent1"/>
-          </a:effectRef>
-          <a:fontRef idx="minor">
-            <a:schemeClr val="lt1"/>
-          </a:fontRef>
-        </p:style>
         <p:txBody>
-          <a:bodyPr rtlCol="0" anchor="ctr"/>
+          <a:bodyPr>
+            <a:normAutofit/>
+          </a:bodyPr>
           <a:lstStyle/>
           <a:p>
-            <a:pPr marL="0" marR="0" lvl="0" indent="0" algn="ctr" defTabSz="914400" rtl="0" eaLnBrk="1" fontAlgn="auto" latinLnBrk="0" hangingPunct="1">
-              <a:lnSpc>
-                <a:spcPct val="100000"/>
-              </a:lnSpc>
-              <a:spcBef>
-                <a:spcPts val="0"/>
-              </a:spcBef>
-              <a:spcAft>
-                <a:spcPts val="0"/>
-              </a:spcAft>
-              <a:buClrTx/>
-              <a:buSzTx/>
-              <a:buFontTx/>
-              <a:buNone/>
-              <a:tabLst/>
-              <a:defRPr/>
-            </a:pPr>
-            <a:endParaRPr kumimoji="0" lang="en-US" sz="1800" b="0" i="0" u="none" strike="noStrike" kern="1200" cap="none" spc="0" normalizeH="0" baseline="0" noProof="0">
-              <a:ln>
-                <a:noFill/>
-              </a:ln>
-              <a:solidFill>
-                <a:srgbClr val="FFFFFF"/>
-              </a:solidFill>
-              <a:effectLst/>
-              <a:uLnTx/>
-              <a:uFillTx/>
-              <a:latin typeface="Calibri" panose="020F0502020204030204"/>
-              <a:ea typeface="+mn-ea"/>
-              <a:cs typeface="+mn-cs"/>
-            </a:endParaRPr>
+            <a:r>
+              <a:rPr lang="en-US" sz="2400" dirty="0" err="1"/>
+              <a:t>Valeurs</a:t>
+            </a:r>
+            <a:r>
+              <a:rPr lang="en-US" sz="2400" dirty="0"/>
+              <a:t> </a:t>
+            </a:r>
+            <a:r>
+              <a:rPr lang="en-US" sz="2400" dirty="0" err="1"/>
+              <a:t>numériques</a:t>
+            </a:r>
+            <a:endParaRPr lang="en-US" sz="2400" dirty="0"/>
+          </a:p>
+          <a:p>
+            <a:endParaRPr lang="en-US" sz="2400" dirty="0"/>
           </a:p>
         </p:txBody>
       </p:sp>
+    </p:spTree>
+    <p:extLst>
+      <p:ext uri="{BB962C8B-B14F-4D97-AF65-F5344CB8AC3E}">
+        <p14:creationId xmlns:p14="http://schemas.microsoft.com/office/powerpoint/2010/main" val="3443617644"/>
+      </p:ext>
+    </p:extLst>
+  </p:cSld>
+  <p:clrMapOvr>
+    <a:masterClrMapping/>
+  </p:clrMapOvr>
+</p:sld>
+</file>
+
+<file path=ppt/slides/slide9.xml><?xml version="1.0" encoding="utf-8"?>
+<p:sld xmlns:a="http://schemas.openxmlformats.org/drawingml/2006/main" xmlns:r="http://schemas.openxmlformats.org/officeDocument/2006/relationships" xmlns:p="http://schemas.openxmlformats.org/presentationml/2006/main">
+  <p:cSld>
+    <p:spTree>
+      <p:nvGrpSpPr>
+        <p:cNvPr id="1" name=""/>
+        <p:cNvGrpSpPr/>
+        <p:nvPr/>
+      </p:nvGrpSpPr>
+      <p:grpSpPr>
+        <a:xfrm>
+          <a:off x="0" y="0"/>
+          <a:ext cx="0" cy="0"/>
+          <a:chOff x="0" y="0"/>
+          <a:chExt cx="0" cy="0"/>
+        </a:xfrm>
+      </p:grpSpPr>
       <p:sp>
         <p:nvSpPr>
-          <p:cNvPr id="38" name="Rectangle 37">
+          <p:cNvPr id="2" name="Titre 1">
             <a:extLst>
               <a:ext uri="{FF2B5EF4-FFF2-40B4-BE49-F238E27FC236}">
-                <a16:creationId xmlns:a16="http://schemas.microsoft.com/office/drawing/2014/main" id="{CBF9EBB4-5078-47B2-AAA0-DF4A88D8182A}"/>
-              </a:ext>
-              <a:ext uri="{C183D7F6-B498-43B3-948B-1728B52AA6E4}">
-                <adec:decorative xmlns:adec="http://schemas.microsoft.com/office/drawing/2017/decorative" val="1"/>
+                <a16:creationId xmlns:a16="http://schemas.microsoft.com/office/drawing/2014/main" id="{C86F9918-71BE-47E7-84A0-92941D00FB32}"/>
               </a:ext>
             </a:extLst>
           </p:cNvPr>
           <p:cNvSpPr>
-            <a:spLocks noGrp="1" noRot="1" noChangeAspect="1" noMove="1" noResize="1" noEditPoints="1" noAdjustHandles="1" noChangeArrowheads="1" noChangeShapeType="1" noTextEdit="1"/>
+            <a:spLocks noGrp="1"/>
           </p:cNvSpPr>
           <p:nvPr>
-            <p:extLst>
-              <p:ext uri="{386F3935-93C4-4BCD-93E2-E3B085C9AB24}">
-                <p16:designElem xmlns:p16="http://schemas.microsoft.com/office/powerpoint/2015/main" val="1"/>
-              </p:ext>
-            </p:extLst>
+            <p:ph type="title"/>
           </p:nvPr>
         </p:nvSpPr>
-        <p:spPr>
-          <a:xfrm>
-            <a:off x="4364940" y="5011563"/>
-            <a:ext cx="731558" cy="731558"/>
-          </a:xfrm>
-          <a:prstGeom prst="rect">
-            <a:avLst/>
-          </a:prstGeom>
-          <a:noFill/>
-          <a:ln w="127000">
-            <a:solidFill>
-              <a:schemeClr val="accent6"/>
-            </a:solidFill>
-            <a:round/>
-          </a:ln>
-        </p:spPr>
-        <p:style>
-          <a:lnRef idx="2">
-            <a:schemeClr val="accent1">
-              <a:shade val="50000"/>
-            </a:schemeClr>
-          </a:lnRef>
-          <a:fillRef idx="1">
-            <a:schemeClr val="accent1"/>
-          </a:fillRef>
-          <a:effectRef idx="0">
-            <a:schemeClr val="accent1"/>
-          </a:effectRef>
-          <a:fontRef idx="minor">
-            <a:schemeClr val="lt1"/>
-          </a:fontRef>
-        </p:style>
+        <p:spPr/>
         <p:txBody>
-          <a:bodyPr rtlCol="0" anchor="ctr"/>
+          <a:bodyPr/>
           <a:lstStyle/>
           <a:p>
-            <a:pPr marL="0" marR="0" lvl="0" indent="0" algn="ctr" defTabSz="914400" rtl="0" eaLnBrk="1" fontAlgn="auto" latinLnBrk="0" hangingPunct="1">
-              <a:lnSpc>
-                <a:spcPct val="100000"/>
-              </a:lnSpc>
-              <a:spcBef>
-                <a:spcPts val="0"/>
-              </a:spcBef>
-              <a:spcAft>
-                <a:spcPts val="0"/>
-              </a:spcAft>
-              <a:buClrTx/>
-              <a:buSzTx/>
-              <a:buFontTx/>
-              <a:buNone/>
-              <a:tabLst/>
-              <a:defRPr/>
-            </a:pPr>
-            <a:endParaRPr kumimoji="0" lang="en-US" sz="1800" b="0" i="0" u="none" strike="noStrike" kern="1200" cap="none" spc="0" normalizeH="0" baseline="0" noProof="0">
-              <a:ln>
-                <a:noFill/>
-              </a:ln>
-              <a:solidFill>
-                <a:srgbClr val="FFFFFF"/>
-              </a:solidFill>
-              <a:effectLst/>
-              <a:uLnTx/>
-              <a:uFillTx/>
-              <a:latin typeface="Calibri" panose="020F0502020204030204"/>
-              <a:ea typeface="+mn-ea"/>
-              <a:cs typeface="+mn-cs"/>
-            </a:endParaRPr>
+            <a:r>
+              <a:rPr lang="fr-FR" dirty="0"/>
+              <a:t>Analyse de fond (suite)</a:t>
+            </a:r>
           </a:p>
         </p:txBody>
       </p:sp>
       <p:pic>
         <p:nvPicPr>
-          <p:cNvPr id="20" name="Image 19">
+          <p:cNvPr id="8" name="Espace réservé du contenu 7">
             <a:extLst>
               <a:ext uri="{FF2B5EF4-FFF2-40B4-BE49-F238E27FC236}">
-                <a16:creationId xmlns:a16="http://schemas.microsoft.com/office/drawing/2014/main" id="{74307612-1E8D-4A08-A276-65E926623876}"/>
+                <a16:creationId xmlns:a16="http://schemas.microsoft.com/office/drawing/2014/main" id="{D5229DE6-452B-4D8A-BC39-34D2F6F56FCB}"/>
+              </a:ext>
+            </a:extLst>
+          </p:cNvPr>
+          <p:cNvPicPr>
+            <a:picLocks noGrp="1" noChangeAspect="1"/>
+          </p:cNvPicPr>
+          <p:nvPr>
+            <p:ph idx="1"/>
+          </p:nvPr>
+        </p:nvPicPr>
+        <p:blipFill>
+          <a:blip r:embed="rId2"/>
+          <a:stretch>
+            <a:fillRect/>
+          </a:stretch>
+        </p:blipFill>
+        <p:spPr>
+          <a:xfrm>
+            <a:off x="961291" y="1821270"/>
+            <a:ext cx="4129874" cy="3859213"/>
+          </a:xfrm>
+        </p:spPr>
+      </p:pic>
+      <p:pic>
+        <p:nvPicPr>
+          <p:cNvPr id="10" name="Image 9">
+            <a:extLst>
+              <a:ext uri="{FF2B5EF4-FFF2-40B4-BE49-F238E27FC236}">
+                <a16:creationId xmlns:a16="http://schemas.microsoft.com/office/drawing/2014/main" id="{05E40DB5-E637-4F56-824F-AC072EB335E0}"/>
               </a:ext>
             </a:extLst>
           </p:cNvPr>
@@ -28985,21 +30572,45 @@
           <p:nvPr/>
         </p:nvPicPr>
         <p:blipFill>
-          <a:blip r:embed="rId3">
-            <a:extLst>
-              <a:ext uri="{28A0092B-C50C-407E-A947-70E740481C1C}">
-                <a14:useLocalDpi xmlns:a14="http://schemas.microsoft.com/office/drawing/2010/main" val="0"/>
-              </a:ext>
-            </a:extLst>
-          </a:blip>
+          <a:blip r:embed="rId3"/>
           <a:stretch>
             <a:fillRect/>
           </a:stretch>
         </p:blipFill>
         <p:spPr>
           <a:xfrm>
-            <a:off x="11476815" y="6204306"/>
-            <a:ext cx="712136" cy="653693"/>
+            <a:off x="5408022" y="2146663"/>
+            <a:ext cx="6282411" cy="1785259"/>
+          </a:xfrm>
+          <a:prstGeom prst="rect">
+            <a:avLst/>
+          </a:prstGeom>
+        </p:spPr>
+      </p:pic>
+      <p:pic>
+        <p:nvPicPr>
+          <p:cNvPr id="12" name="Image 11">
+            <a:extLst>
+              <a:ext uri="{FF2B5EF4-FFF2-40B4-BE49-F238E27FC236}">
+                <a16:creationId xmlns:a16="http://schemas.microsoft.com/office/drawing/2014/main" id="{DCE8D8E5-F61B-4720-88DA-C3C95BB271DF}"/>
+              </a:ext>
+            </a:extLst>
+          </p:cNvPr>
+          <p:cNvPicPr>
+            <a:picLocks noChangeAspect="1"/>
+          </p:cNvPicPr>
+          <p:nvPr/>
+        </p:nvPicPr>
+        <p:blipFill>
+          <a:blip r:embed="rId4"/>
+          <a:stretch>
+            <a:fillRect/>
+          </a:stretch>
+        </p:blipFill>
+        <p:spPr>
+          <a:xfrm>
+            <a:off x="5613078" y="4254061"/>
+            <a:ext cx="6077355" cy="1693892"/>
           </a:xfrm>
           <a:prstGeom prst="rect">
             <a:avLst/>
@@ -29009,7 +30620,7 @@
     </p:spTree>
     <p:extLst>
       <p:ext uri="{BB962C8B-B14F-4D97-AF65-F5344CB8AC3E}">
-        <p14:creationId xmlns:p14="http://schemas.microsoft.com/office/powerpoint/2010/main" val="699059219"/>
+        <p14:creationId xmlns:p14="http://schemas.microsoft.com/office/powerpoint/2010/main" val="198474337"/>
       </p:ext>
     </p:extLst>
   </p:cSld>

</xml_diff>